<commit_message>
Added notes to all slides
</commit_message>
<xml_diff>
--- a/Presentation/Gun Violence.pptx
+++ b/Presentation/Gun Violence.pptx
@@ -5,7 +5,7 @@
     <p:sldMasterId id="2147483660" r:id="rId1"/>
   </p:sldMasterIdLst>
   <p:notesMasterIdLst>
-    <p:notesMasterId r:id="rId18"/>
+    <p:notesMasterId r:id="rId19"/>
   </p:notesMasterIdLst>
   <p:sldIdLst>
     <p:sldId id="256" r:id="rId2"/>
@@ -18,12 +18,13 @@
     <p:sldId id="261" r:id="rId9"/>
     <p:sldId id="268" r:id="rId10"/>
     <p:sldId id="269" r:id="rId11"/>
-    <p:sldId id="266" r:id="rId12"/>
-    <p:sldId id="262" r:id="rId13"/>
-    <p:sldId id="263" r:id="rId14"/>
-    <p:sldId id="264" r:id="rId15"/>
-    <p:sldId id="272" r:id="rId16"/>
-    <p:sldId id="265" r:id="rId17"/>
+    <p:sldId id="273" r:id="rId12"/>
+    <p:sldId id="266" r:id="rId13"/>
+    <p:sldId id="262" r:id="rId14"/>
+    <p:sldId id="263" r:id="rId15"/>
+    <p:sldId id="264" r:id="rId16"/>
+    <p:sldId id="272" r:id="rId17"/>
+    <p:sldId id="265" r:id="rId18"/>
   </p:sldIdLst>
   <p:sldSz cx="12192000" cy="6858000"/>
   <p:notesSz cx="6858000" cy="9144000"/>
@@ -762,6 +763,228 @@
           <a:lstStyle/>
           <a:p>
             <a:r>
+              <a:rPr lang="en-US" b="1" dirty="0"/>
+              <a:t>Question appears </a:t>
+            </a:r>
+            <a:r>
+              <a:rPr lang="en-US" dirty="0"/>
+              <a:t>-&gt; [Narrator] Discuss what we tried to investigate and what are the components of ‘gun-friendliness’ rating -&gt; </a:t>
+            </a:r>
+            <a:r>
+              <a:rPr lang="en-US" b="1" dirty="0"/>
+              <a:t>Click</a:t>
+            </a:r>
+            <a:r>
+              <a:rPr lang="en-US" dirty="0"/>
+              <a:t> -&gt; </a:t>
+            </a:r>
+            <a:r>
+              <a:rPr lang="en-US" b="1" dirty="0"/>
+              <a:t>Answer appears </a:t>
+            </a:r>
+            <a:r>
+              <a:rPr lang="en-US" dirty="0"/>
+              <a:t>-&gt; </a:t>
+            </a:r>
+            <a:r>
+              <a:rPr lang="en-US" b="1" dirty="0"/>
+              <a:t>Charts appear </a:t>
+            </a:r>
+            <a:r>
+              <a:rPr lang="en-US" dirty="0"/>
+              <a:t>-&gt; [Narrator] Draw a conclusion that there is no correlation</a:t>
+            </a:r>
+          </a:p>
+        </p:txBody>
+      </p:sp>
+      <p:sp>
+        <p:nvSpPr>
+          <p:cNvPr id="4" name="Slide Number Placeholder 3"/>
+          <p:cNvSpPr>
+            <a:spLocks noGrp="1"/>
+          </p:cNvSpPr>
+          <p:nvPr>
+            <p:ph type="sldNum" sz="quarter" idx="5"/>
+          </p:nvPr>
+        </p:nvSpPr>
+        <p:spPr/>
+        <p:txBody>
+          <a:bodyPr/>
+          <a:lstStyle/>
+          <a:p>
+            <a:fld id="{15736144-2E2E-483E-8D4E-7A087D64C6CE}" type="slidenum">
+              <a:rPr lang="en-US" smtClean="0"/>
+              <a:t>11</a:t>
+            </a:fld>
+            <a:endParaRPr lang="en-US"/>
+          </a:p>
+        </p:txBody>
+      </p:sp>
+    </p:spTree>
+    <p:extLst>
+      <p:ext uri="{BB962C8B-B14F-4D97-AF65-F5344CB8AC3E}">
+        <p14:creationId xmlns:p14="http://schemas.microsoft.com/office/powerpoint/2010/main" val="965858639"/>
+      </p:ext>
+    </p:extLst>
+  </p:cSld>
+  <p:clrMapOvr>
+    <a:masterClrMapping/>
+  </p:clrMapOvr>
+</p:notes>
+</file>
+
+<file path=ppt/notesSlides/notesSlide12.xml><?xml version="1.0" encoding="utf-8"?>
+<p:notes xmlns:a="http://schemas.openxmlformats.org/drawingml/2006/main" xmlns:r="http://schemas.openxmlformats.org/officeDocument/2006/relationships" xmlns:p="http://schemas.openxmlformats.org/presentationml/2006/main">
+  <p:cSld>
+    <p:spTree>
+      <p:nvGrpSpPr>
+        <p:cNvPr id="1" name=""/>
+        <p:cNvGrpSpPr/>
+        <p:nvPr/>
+      </p:nvGrpSpPr>
+      <p:grpSpPr>
+        <a:xfrm>
+          <a:off x="0" y="0"/>
+          <a:ext cx="0" cy="0"/>
+          <a:chOff x="0" y="0"/>
+          <a:chExt cx="0" cy="0"/>
+        </a:xfrm>
+      </p:grpSpPr>
+      <p:sp>
+        <p:nvSpPr>
+          <p:cNvPr id="2" name="Slide Image Placeholder 1"/>
+          <p:cNvSpPr>
+            <a:spLocks noGrp="1" noRot="1" noChangeAspect="1"/>
+          </p:cNvSpPr>
+          <p:nvPr>
+            <p:ph type="sldImg"/>
+          </p:nvPr>
+        </p:nvSpPr>
+        <p:spPr/>
+      </p:sp>
+      <p:sp>
+        <p:nvSpPr>
+          <p:cNvPr id="3" name="Notes Placeholder 2"/>
+          <p:cNvSpPr>
+            <a:spLocks noGrp="1"/>
+          </p:cNvSpPr>
+          <p:nvPr>
+            <p:ph type="body" idx="1"/>
+          </p:nvPr>
+        </p:nvSpPr>
+        <p:spPr/>
+        <p:txBody>
+          <a:bodyPr/>
+          <a:lstStyle/>
+          <a:p>
+            <a:r>
+              <a:rPr lang="en-US" b="1" dirty="0"/>
+              <a:t>Question appears </a:t>
+            </a:r>
+            <a:r>
+              <a:rPr lang="en-US" dirty="0"/>
+              <a:t>-&gt; [Narrator] Explain your goal for uncovering demography-related trends -&gt; </a:t>
+            </a:r>
+            <a:r>
+              <a:rPr lang="en-US" b="1" dirty="0"/>
+              <a:t>Click</a:t>
+            </a:r>
+            <a:r>
+              <a:rPr lang="en-US" dirty="0"/>
+              <a:t> -&gt; </a:t>
+            </a:r>
+            <a:r>
+              <a:rPr lang="en-US" b="1" dirty="0"/>
+              <a:t>Answer appears -&gt; Charts appear </a:t>
+            </a:r>
+            <a:r>
+              <a:rPr lang="en-US" dirty="0"/>
+              <a:t>-&gt; [Narrator] Draw a conclusion on the high amount of incident that involve teens and kids</a:t>
+            </a:r>
+          </a:p>
+        </p:txBody>
+      </p:sp>
+      <p:sp>
+        <p:nvSpPr>
+          <p:cNvPr id="4" name="Slide Number Placeholder 3"/>
+          <p:cNvSpPr>
+            <a:spLocks noGrp="1"/>
+          </p:cNvSpPr>
+          <p:nvPr>
+            <p:ph type="sldNum" sz="quarter" idx="5"/>
+          </p:nvPr>
+        </p:nvSpPr>
+        <p:spPr/>
+        <p:txBody>
+          <a:bodyPr/>
+          <a:lstStyle/>
+          <a:p>
+            <a:fld id="{15736144-2E2E-483E-8D4E-7A087D64C6CE}" type="slidenum">
+              <a:rPr lang="en-US" smtClean="0"/>
+              <a:t>12</a:t>
+            </a:fld>
+            <a:endParaRPr lang="en-US"/>
+          </a:p>
+        </p:txBody>
+      </p:sp>
+    </p:spTree>
+    <p:extLst>
+      <p:ext uri="{BB962C8B-B14F-4D97-AF65-F5344CB8AC3E}">
+        <p14:creationId xmlns:p14="http://schemas.microsoft.com/office/powerpoint/2010/main" val="3675090310"/>
+      </p:ext>
+    </p:extLst>
+  </p:cSld>
+  <p:clrMapOvr>
+    <a:masterClrMapping/>
+  </p:clrMapOvr>
+</p:notes>
+</file>
+
+<file path=ppt/notesSlides/notesSlide13.xml><?xml version="1.0" encoding="utf-8"?>
+<p:notes xmlns:a="http://schemas.openxmlformats.org/drawingml/2006/main" xmlns:r="http://schemas.openxmlformats.org/officeDocument/2006/relationships" xmlns:p="http://schemas.openxmlformats.org/presentationml/2006/main">
+  <p:cSld>
+    <p:spTree>
+      <p:nvGrpSpPr>
+        <p:cNvPr id="1" name=""/>
+        <p:cNvGrpSpPr/>
+        <p:nvPr/>
+      </p:nvGrpSpPr>
+      <p:grpSpPr>
+        <a:xfrm>
+          <a:off x="0" y="0"/>
+          <a:ext cx="0" cy="0"/>
+          <a:chOff x="0" y="0"/>
+          <a:chExt cx="0" cy="0"/>
+        </a:xfrm>
+      </p:grpSpPr>
+      <p:sp>
+        <p:nvSpPr>
+          <p:cNvPr id="2" name="Slide Image Placeholder 1"/>
+          <p:cNvSpPr>
+            <a:spLocks noGrp="1" noRot="1" noChangeAspect="1"/>
+          </p:cNvSpPr>
+          <p:nvPr>
+            <p:ph type="sldImg"/>
+          </p:nvPr>
+        </p:nvSpPr>
+        <p:spPr/>
+      </p:sp>
+      <p:sp>
+        <p:nvSpPr>
+          <p:cNvPr id="3" name="Notes Placeholder 2"/>
+          <p:cNvSpPr>
+            <a:spLocks noGrp="1"/>
+          </p:cNvSpPr>
+          <p:nvPr>
+            <p:ph type="body" idx="1"/>
+          </p:nvPr>
+        </p:nvSpPr>
+        <p:spPr/>
+        <p:txBody>
+          <a:bodyPr/>
+          <a:lstStyle/>
+          <a:p>
+            <a:r>
               <a:rPr lang="en-US" dirty="0"/>
               <a:t>[Narrator] A couple of words about upcoming data – incidents are categorized, one incident can belong to multiple categories [Click] -&gt; </a:t>
             </a:r>
@@ -793,7 +1016,7 @@
           <a:p>
             <a:fld id="{15736144-2E2E-483E-8D4E-7A087D64C6CE}" type="slidenum">
               <a:rPr lang="en-US" smtClean="0"/>
-              <a:t>12</a:t>
+              <a:t>13</a:t>
             </a:fld>
             <a:endParaRPr lang="en-US"/>
           </a:p>
@@ -812,7 +1035,7 @@
 </p:notes>
 </file>
 
-<file path=ppt/notesSlides/notesSlide12.xml><?xml version="1.0" encoding="utf-8"?>
+<file path=ppt/notesSlides/notesSlide14.xml><?xml version="1.0" encoding="utf-8"?>
 <p:notes xmlns:a="http://schemas.openxmlformats.org/drawingml/2006/main" xmlns:r="http://schemas.openxmlformats.org/officeDocument/2006/relationships" xmlns:p="http://schemas.openxmlformats.org/presentationml/2006/main">
   <p:cSld>
     <p:spTree>
@@ -888,7 +1111,7 @@
           <a:p>
             <a:fld id="{15736144-2E2E-483E-8D4E-7A087D64C6CE}" type="slidenum">
               <a:rPr lang="en-US" smtClean="0"/>
-              <a:t>13</a:t>
+              <a:t>14</a:t>
             </a:fld>
             <a:endParaRPr lang="en-US"/>
           </a:p>
@@ -907,7 +1130,7 @@
 </p:notes>
 </file>
 
-<file path=ppt/notesSlides/notesSlide13.xml><?xml version="1.0" encoding="utf-8"?>
+<file path=ppt/notesSlides/notesSlide15.xml><?xml version="1.0" encoding="utf-8"?>
 <p:notes xmlns:a="http://schemas.openxmlformats.org/drawingml/2006/main" xmlns:r="http://schemas.openxmlformats.org/officeDocument/2006/relationships" xmlns:p="http://schemas.openxmlformats.org/presentationml/2006/main">
   <p:cSld>
     <p:spTree>
@@ -1000,7 +1223,7 @@
           <a:p>
             <a:fld id="{15736144-2E2E-483E-8D4E-7A087D64C6CE}" type="slidenum">
               <a:rPr lang="en-US" smtClean="0"/>
-              <a:t>14</a:t>
+              <a:t>15</a:t>
             </a:fld>
             <a:endParaRPr lang="en-US"/>
           </a:p>
@@ -1019,7 +1242,7 @@
 </p:notes>
 </file>
 
-<file path=ppt/notesSlides/notesSlide14.xml><?xml version="1.0" encoding="utf-8"?>
+<file path=ppt/notesSlides/notesSlide16.xml><?xml version="1.0" encoding="utf-8"?>
 <p:notes xmlns:a="http://schemas.openxmlformats.org/drawingml/2006/main" xmlns:r="http://schemas.openxmlformats.org/officeDocument/2006/relationships" xmlns:p="http://schemas.openxmlformats.org/presentationml/2006/main">
   <p:cSld>
     <p:spTree>
@@ -1063,7 +1286,22 @@
           <a:bodyPr/>
           <a:lstStyle/>
           <a:p>
-            <a:endParaRPr lang="en-US" dirty="0"/>
+            <a:r>
+              <a:rPr lang="en-US" b="1" dirty="0"/>
+              <a:t>Question appears </a:t>
+            </a:r>
+            <a:r>
+              <a:rPr lang="en-US" dirty="0"/>
+              <a:t>-&gt; [Narrator] Start telling about what out analysis lacks -&gt; [Click] </a:t>
+            </a:r>
+            <a:r>
+              <a:rPr lang="en-US" b="1" dirty="0"/>
+              <a:t>Future analysis directions appear </a:t>
+            </a:r>
+            <a:r>
+              <a:rPr lang="en-US" dirty="0"/>
+              <a:t>-&gt; [Narrator] Explain the categories (do we get more e.g. suicides over time, is there a correlation between CCW and kill count, does the weapon permit effectively reduce the number of home invasion incidents, how much does poverty influence the incidents number)</a:t>
+            </a:r>
           </a:p>
         </p:txBody>
       </p:sp>
@@ -1084,7 +1322,7 @@
           <a:p>
             <a:fld id="{15736144-2E2E-483E-8D4E-7A087D64C6CE}" type="slidenum">
               <a:rPr lang="en-US" smtClean="0"/>
-              <a:t>15</a:t>
+              <a:t>16</a:t>
             </a:fld>
             <a:endParaRPr lang="en-US"/>
           </a:p>
@@ -1103,7 +1341,7 @@
 </p:notes>
 </file>
 
-<file path=ppt/notesSlides/notesSlide15.xml><?xml version="1.0" encoding="utf-8"?>
+<file path=ppt/notesSlides/notesSlide17.xml><?xml version="1.0" encoding="utf-8"?>
 <p:notes xmlns:a="http://schemas.openxmlformats.org/drawingml/2006/main" xmlns:r="http://schemas.openxmlformats.org/officeDocument/2006/relationships" xmlns:p="http://schemas.openxmlformats.org/presentationml/2006/main">
   <p:cSld>
     <p:spTree>
@@ -1147,7 +1385,10 @@
           <a:bodyPr/>
           <a:lstStyle/>
           <a:p>
-            <a:endParaRPr lang="en-US" dirty="0"/>
+            <a:r>
+              <a:rPr lang="en-US" dirty="0"/>
+              <a:t>Wait for bullets to show up</a:t>
+            </a:r>
           </a:p>
         </p:txBody>
       </p:sp>
@@ -1168,7 +1409,7 @@
           <a:p>
             <a:fld id="{15736144-2E2E-483E-8D4E-7A087D64C6CE}" type="slidenum">
               <a:rPr lang="en-US" smtClean="0"/>
-              <a:t>16</a:t>
+              <a:t>17</a:t>
             </a:fld>
             <a:endParaRPr lang="en-US"/>
           </a:p>
@@ -1596,7 +1837,30 @@
           <a:bodyPr/>
           <a:lstStyle/>
           <a:p>
-            <a:endParaRPr lang="en-US" dirty="0"/>
+            <a:r>
+              <a:rPr lang="en-US" b="1" dirty="0"/>
+              <a:t>Question appears </a:t>
+            </a:r>
+            <a:r>
+              <a:rPr lang="en-US" dirty="0"/>
+              <a:t>-&gt; [Narrator] So, here are the other data sources we used [Click] </a:t>
+            </a:r>
+            <a:r>
+              <a:rPr lang="en-US" b="1" dirty="0"/>
+              <a:t>-&gt; Census data appears </a:t>
+            </a:r>
+            <a:r>
+              <a:rPr lang="en-US" dirty="0"/>
+              <a:t>-&gt; [Narrator] Census data is available on demand and doesn’t necessary need to be stored in the repository [Click] -&gt; </a:t>
+            </a:r>
+            <a:r>
+              <a:rPr lang="en-US" b="1" dirty="0"/>
+              <a:t>Star ratings appear </a:t>
+            </a:r>
+            <a:r>
+              <a:rPr lang="en-US" dirty="0"/>
+              <a:t>-&gt; [Narrator] That source didn’t have the ability to download the data so we had to scrape them by hands</a:t>
+            </a:r>
           </a:p>
         </p:txBody>
       </p:sp>
@@ -1767,7 +2031,38 @@
           <a:bodyPr/>
           <a:lstStyle/>
           <a:p>
-            <a:endParaRPr lang="en-US" dirty="0"/>
+            <a:r>
+              <a:rPr lang="en-US" b="1" dirty="0"/>
+              <a:t>Question appears </a:t>
+            </a:r>
+            <a:r>
+              <a:rPr lang="en-US" dirty="0"/>
+              <a:t>-&gt; [Narrator] A couple of words on what we look for comparing time and incident number -&gt; [Click] -&gt; </a:t>
+            </a:r>
+            <a:r>
+              <a:rPr lang="en-US" b="1" dirty="0"/>
+              <a:t>Answer appears </a:t>
+            </a:r>
+            <a:r>
+              <a:rPr lang="en-US" dirty="0"/>
+              <a:t>-&gt; </a:t>
+            </a:r>
+            <a:r>
+              <a:rPr lang="en-US" b="1" dirty="0"/>
+              <a:t>Charts appear </a:t>
+            </a:r>
+            <a:r>
+              <a:rPr lang="en-US" dirty="0"/>
+              <a:t>-&gt; [Narrator] Draw a </a:t>
+            </a:r>
+            <a:r>
+              <a:rPr lang="en-US" dirty="0" err="1"/>
+              <a:t>conslusion</a:t>
+            </a:r>
+            <a:r>
+              <a:rPr lang="en-US" dirty="0"/>
+              <a:t> on the number of incidents growing</a:t>
+            </a:r>
           </a:p>
         </p:txBody>
       </p:sp>
@@ -1853,7 +2148,31 @@
           <a:p>
             <a:r>
               <a:rPr lang="en-US" dirty="0"/>
-              <a:t>[Narrator] A couple of words about upcoming data – more incidents means more danger [Click] -&gt; Answer appears -&gt; State stats appears -&gt; [Narrator] Discuss the statistics, be ready to explain the lack of per capita data. [Click] -&gt; City data appears -&gt; [Narrator] Discuss the statistics, mention Chicago and its mafia history</a:t>
+              <a:t>Question appears [Narrator] A couple of words about upcoming data – more incidents means more danger [Click] -&gt; </a:t>
+            </a:r>
+            <a:r>
+              <a:rPr lang="en-US" b="1" dirty="0"/>
+              <a:t>Answer appears </a:t>
+            </a:r>
+            <a:r>
+              <a:rPr lang="en-US" dirty="0"/>
+              <a:t>-&gt; </a:t>
+            </a:r>
+            <a:r>
+              <a:rPr lang="en-US" b="1" dirty="0"/>
+              <a:t>State stats appears </a:t>
+            </a:r>
+            <a:r>
+              <a:rPr lang="en-US" dirty="0"/>
+              <a:t>-&gt; [Narrator] Discuss the statistics drawing attention to the top states [Click] -&gt; </a:t>
+            </a:r>
+            <a:r>
+              <a:rPr lang="en-US" b="1" dirty="0"/>
+              <a:t>City data appears</a:t>
+            </a:r>
+            <a:r>
+              <a:rPr lang="en-US" dirty="0"/>
+              <a:t> -&gt; [Narrator] Discuss the statistics, mention Chicago and its mafia history</a:t>
             </a:r>
           </a:p>
         </p:txBody>
@@ -5136,15 +5455,7 @@
             </a:pPr>
             <a:r>
               <a:rPr lang="en-US" sz="3200" dirty="0"/>
-              <a:t> </a:t>
-            </a:r>
-            <a:r>
-              <a:rPr lang="en-US" sz="3200" dirty="0" err="1"/>
-              <a:t>Kimmay</a:t>
-            </a:r>
-            <a:r>
-              <a:rPr lang="en-US" sz="3200" dirty="0"/>
-              <a:t> Truong</a:t>
+              <a:t> Kimmy Truong</a:t>
             </a:r>
           </a:p>
         </p:txBody>
@@ -5795,76 +6106,6 @@
       </p:grpSpPr>
       <p:pic>
         <p:nvPicPr>
-          <p:cNvPr id="2" name="Picture 1"/>
-          <p:cNvPicPr>
-            <a:picLocks noChangeAspect="1"/>
-          </p:cNvPicPr>
-          <p:nvPr/>
-        </p:nvPicPr>
-        <p:blipFill>
-          <a:blip r:embed="rId4">
-            <a:extLst>
-              <a:ext uri="{28A0092B-C50C-407E-A947-70E740481C1C}">
-                <a14:useLocalDpi xmlns:a14="http://schemas.microsoft.com/office/drawing/2010/main" val="0"/>
-              </a:ext>
-            </a:extLst>
-          </a:blip>
-          <a:stretch>
-            <a:fillRect/>
-          </a:stretch>
-        </p:blipFill>
-        <p:spPr>
-          <a:xfrm>
-            <a:off x="78750" y="1534211"/>
-            <a:ext cx="12007344" cy="2183153"/>
-          </a:xfrm>
-          <a:prstGeom prst="rect">
-            <a:avLst/>
-          </a:prstGeom>
-          <a:ln>
-            <a:solidFill>
-              <a:schemeClr val="tx1"/>
-            </a:solidFill>
-          </a:ln>
-        </p:spPr>
-      </p:pic>
-      <p:pic>
-        <p:nvPicPr>
-          <p:cNvPr id="3" name="Picture 2"/>
-          <p:cNvPicPr>
-            <a:picLocks noChangeAspect="1"/>
-          </p:cNvPicPr>
-          <p:nvPr/>
-        </p:nvPicPr>
-        <p:blipFill>
-          <a:blip r:embed="rId5">
-            <a:extLst>
-              <a:ext uri="{28A0092B-C50C-407E-A947-70E740481C1C}">
-                <a14:useLocalDpi xmlns:a14="http://schemas.microsoft.com/office/drawing/2010/main" val="0"/>
-              </a:ext>
-            </a:extLst>
-          </a:blip>
-          <a:stretch>
-            <a:fillRect/>
-          </a:stretch>
-        </p:blipFill>
-        <p:spPr>
-          <a:xfrm>
-            <a:off x="78749" y="4131703"/>
-            <a:ext cx="12077043" cy="2195826"/>
-          </a:xfrm>
-          <a:prstGeom prst="rect">
-            <a:avLst/>
-          </a:prstGeom>
-          <a:ln>
-            <a:solidFill>
-              <a:schemeClr val="tx1"/>
-            </a:solidFill>
-          </a:ln>
-        </p:spPr>
-      </p:pic>
-      <p:pic>
-        <p:nvPicPr>
           <p:cNvPr id="8" name="Picture 7"/>
           <p:cNvPicPr>
             <a:picLocks noChangeAspect="1"/>
@@ -5872,7 +6113,7 @@
           <p:nvPr/>
         </p:nvPicPr>
         <p:blipFill>
-          <a:blip r:embed="rId6"/>
+          <a:blip r:embed="rId4"/>
           <a:stretch>
             <a:fillRect/>
           </a:stretch>
@@ -5944,6 +6185,78 @@
           </a:p>
         </p:txBody>
       </p:sp>
+      <p:pic>
+        <p:nvPicPr>
+          <p:cNvPr id="7" name="Picture 6">
+            <a:extLst>
+              <a:ext uri="{FF2B5EF4-FFF2-40B4-BE49-F238E27FC236}">
+                <a16:creationId xmlns:a16="http://schemas.microsoft.com/office/drawing/2014/main" id="{5956967E-EDC0-496B-BB84-94316F8C6AD0}"/>
+              </a:ext>
+            </a:extLst>
+          </p:cNvPr>
+          <p:cNvPicPr>
+            <a:picLocks noChangeAspect="1"/>
+          </p:cNvPicPr>
+          <p:nvPr/>
+        </p:nvPicPr>
+        <p:blipFill>
+          <a:blip r:embed="rId5">
+            <a:extLst>
+              <a:ext uri="{28A0092B-C50C-407E-A947-70E740481C1C}">
+                <a14:useLocalDpi xmlns:a14="http://schemas.microsoft.com/office/drawing/2010/main" val="0"/>
+              </a:ext>
+            </a:extLst>
+          </a:blip>
+          <a:stretch>
+            <a:fillRect/>
+          </a:stretch>
+        </p:blipFill>
+        <p:spPr>
+          <a:xfrm>
+            <a:off x="4580" y="1449557"/>
+            <a:ext cx="12187420" cy="2612909"/>
+          </a:xfrm>
+          <a:prstGeom prst="rect">
+            <a:avLst/>
+          </a:prstGeom>
+        </p:spPr>
+      </p:pic>
+      <p:pic>
+        <p:nvPicPr>
+          <p:cNvPr id="9" name="Picture 8">
+            <a:extLst>
+              <a:ext uri="{FF2B5EF4-FFF2-40B4-BE49-F238E27FC236}">
+                <a16:creationId xmlns:a16="http://schemas.microsoft.com/office/drawing/2014/main" id="{F0E44A6E-3E94-4B05-B18F-DBA2D0A0CB47}"/>
+              </a:ext>
+            </a:extLst>
+          </p:cNvPr>
+          <p:cNvPicPr>
+            <a:picLocks noChangeAspect="1"/>
+          </p:cNvPicPr>
+          <p:nvPr/>
+        </p:nvPicPr>
+        <p:blipFill>
+          <a:blip r:embed="rId6">
+            <a:extLst>
+              <a:ext uri="{28A0092B-C50C-407E-A947-70E740481C1C}">
+                <a14:useLocalDpi xmlns:a14="http://schemas.microsoft.com/office/drawing/2010/main" val="0"/>
+              </a:ext>
+            </a:extLst>
+          </a:blip>
+          <a:stretch>
+            <a:fillRect/>
+          </a:stretch>
+        </p:blipFill>
+        <p:spPr>
+          <a:xfrm>
+            <a:off x="7657" y="4151599"/>
+            <a:ext cx="12181266" cy="2611590"/>
+          </a:xfrm>
+          <a:prstGeom prst="rect">
+            <a:avLst/>
+          </a:prstGeom>
+        </p:spPr>
+      </p:pic>
     </p:spTree>
     <p:extLst>
       <p:ext uri="{BB962C8B-B14F-4D97-AF65-F5344CB8AC3E}">
@@ -6060,9 +6373,9 @@
                             </p:stCondLst>
                             <p:childTnLst>
                               <p:par>
-                                <p:cTn id="10" presetID="2" presetClass="entr" presetSubtype="8" fill="hold" nodeType="afterEffect">
+                                <p:cTn id="10" presetID="2" presetClass="entr" presetSubtype="1" fill="hold" nodeType="afterEffect">
                                   <p:stCondLst>
-                                    <p:cond delay="1000"/>
+                                    <p:cond delay="250"/>
                                   </p:stCondLst>
                                   <p:childTnLst>
                                     <p:set>
@@ -6073,7 +6386,7 @@
                                           </p:stCondLst>
                                         </p:cTn>
                                         <p:tgtEl>
-                                          <p:spTgt spid="2"/>
+                                          <p:spTgt spid="8"/>
                                         </p:tgtEl>
                                         <p:attrNameLst>
                                           <p:attrName>style.visibility</p:attrName>
@@ -6087,7 +6400,7 @@
                                       <p:cBhvr additive="base">
                                         <p:cTn id="12" dur="500" fill="hold"/>
                                         <p:tgtEl>
-                                          <p:spTgt spid="2"/>
+                                          <p:spTgt spid="8"/>
                                         </p:tgtEl>
                                         <p:attrNameLst>
                                           <p:attrName>ppt_x</p:attrName>
@@ -6096,7 +6409,7 @@
                                       <p:tavLst>
                                         <p:tav tm="0">
                                           <p:val>
-                                            <p:strVal val="0-#ppt_w/2"/>
+                                            <p:strVal val="#ppt_x"/>
                                           </p:val>
                                         </p:tav>
                                         <p:tav tm="100000">
@@ -6110,7 +6423,7 @@
                                       <p:cBhvr additive="base">
                                         <p:cTn id="13" dur="500" fill="hold"/>
                                         <p:tgtEl>
-                                          <p:spTgt spid="2"/>
+                                          <p:spTgt spid="8"/>
                                         </p:tgtEl>
                                         <p:attrNameLst>
                                           <p:attrName>ppt_y</p:attrName>
@@ -6119,7 +6432,7 @@
                                       <p:tavLst>
                                         <p:tav tm="0">
                                           <p:val>
-                                            <p:strVal val="#ppt_y"/>
+                                            <p:strVal val="0-#ppt_h/2"/>
                                           </p:val>
                                         </p:tav>
                                         <p:tav tm="100000">
@@ -6133,9 +6446,9 @@
                                 </p:cTn>
                               </p:par>
                               <p:par>
-                                <p:cTn id="14" presetID="2" presetClass="entr" presetSubtype="2" fill="hold" nodeType="withEffect">
+                                <p:cTn id="14" presetID="2" presetClass="entr" presetSubtype="8" fill="hold" nodeType="withEffect">
                                   <p:stCondLst>
-                                    <p:cond delay="1250"/>
+                                    <p:cond delay="250"/>
                                   </p:stCondLst>
                                   <p:childTnLst>
                                     <p:set>
@@ -6146,7 +6459,7 @@
                                           </p:stCondLst>
                                         </p:cTn>
                                         <p:tgtEl>
-                                          <p:spTgt spid="3"/>
+                                          <p:spTgt spid="7"/>
                                         </p:tgtEl>
                                         <p:attrNameLst>
                                           <p:attrName>style.visibility</p:attrName>
@@ -6160,7 +6473,7 @@
                                       <p:cBhvr additive="base">
                                         <p:cTn id="16" dur="500" fill="hold"/>
                                         <p:tgtEl>
-                                          <p:spTgt spid="3"/>
+                                          <p:spTgt spid="7"/>
                                         </p:tgtEl>
                                         <p:attrNameLst>
                                           <p:attrName>ppt_x</p:attrName>
@@ -6169,7 +6482,7 @@
                                       <p:tavLst>
                                         <p:tav tm="0">
                                           <p:val>
-                                            <p:strVal val="1+#ppt_w/2"/>
+                                            <p:strVal val="0-#ppt_w/2"/>
                                           </p:val>
                                         </p:tav>
                                         <p:tav tm="100000">
@@ -6183,7 +6496,7 @@
                                       <p:cBhvr additive="base">
                                         <p:cTn id="17" dur="500" fill="hold"/>
                                         <p:tgtEl>
-                                          <p:spTgt spid="3"/>
+                                          <p:spTgt spid="7"/>
                                         </p:tgtEl>
                                         <p:attrNameLst>
                                           <p:attrName>ppt_y</p:attrName>
@@ -6205,30 +6518,21 @@
                                   </p:childTnLst>
                                 </p:cTn>
                               </p:par>
-                            </p:childTnLst>
-                          </p:cTn>
-                        </p:par>
-                        <p:par>
-                          <p:cTn id="18" fill="hold">
-                            <p:stCondLst>
-                              <p:cond delay="2250"/>
-                            </p:stCondLst>
-                            <p:childTnLst>
                               <p:par>
-                                <p:cTn id="19" presetID="2" presetClass="entr" presetSubtype="1" fill="hold" nodeType="afterEffect">
+                                <p:cTn id="18" presetID="2" presetClass="entr" presetSubtype="2" fill="hold" nodeType="withEffect">
                                   <p:stCondLst>
-                                    <p:cond delay="250"/>
+                                    <p:cond delay="500"/>
                                   </p:stCondLst>
                                   <p:childTnLst>
                                     <p:set>
                                       <p:cBhvr>
-                                        <p:cTn id="20" dur="1" fill="hold">
+                                        <p:cTn id="19" dur="1" fill="hold">
                                           <p:stCondLst>
                                             <p:cond delay="0"/>
                                           </p:stCondLst>
                                         </p:cTn>
                                         <p:tgtEl>
-                                          <p:spTgt spid="8"/>
+                                          <p:spTgt spid="9"/>
                                         </p:tgtEl>
                                         <p:attrNameLst>
                                           <p:attrName>style.visibility</p:attrName>
@@ -6240,9 +6544,9 @@
                                     </p:set>
                                     <p:anim calcmode="lin" valueType="num">
                                       <p:cBhvr additive="base">
-                                        <p:cTn id="21" dur="500" fill="hold"/>
-                                        <p:tgtEl>
-                                          <p:spTgt spid="8"/>
+                                        <p:cTn id="20" dur="500" fill="hold"/>
+                                        <p:tgtEl>
+                                          <p:spTgt spid="9"/>
                                         </p:tgtEl>
                                         <p:attrNameLst>
                                           <p:attrName>ppt_x</p:attrName>
@@ -6251,7 +6555,7 @@
                                       <p:tavLst>
                                         <p:tav tm="0">
                                           <p:val>
-                                            <p:strVal val="#ppt_x"/>
+                                            <p:strVal val="1+#ppt_w/2"/>
                                           </p:val>
                                         </p:tav>
                                         <p:tav tm="100000">
@@ -6263,9 +6567,9 @@
                                     </p:anim>
                                     <p:anim calcmode="lin" valueType="num">
                                       <p:cBhvr additive="base">
-                                        <p:cTn id="22" dur="500" fill="hold"/>
-                                        <p:tgtEl>
-                                          <p:spTgt spid="8"/>
+                                        <p:cTn id="21" dur="500" fill="hold"/>
+                                        <p:tgtEl>
+                                          <p:spTgt spid="9"/>
                                         </p:tgtEl>
                                         <p:attrNameLst>
                                           <p:attrName>ppt_y</p:attrName>
@@ -6274,7 +6578,7 @@
                                       <p:tavLst>
                                         <p:tav tm="0">
                                           <p:val>
-                                            <p:strVal val="0-#ppt_h/2"/>
+                                            <p:strVal val="#ppt_y"/>
                                           </p:val>
                                         </p:tav>
                                         <p:tav tm="100000">
@@ -6327,7 +6631,610 @@
     <p:bg>
       <p:bgPr>
         <a:blipFill dpi="0" rotWithShape="1">
-          <a:blip r:embed="rId2">
+          <a:blip r:embed="rId3">
+            <a:lum/>
+          </a:blip>
+          <a:srcRect/>
+          <a:stretch>
+            <a:fillRect/>
+          </a:stretch>
+        </a:blipFill>
+        <a:effectLst/>
+      </p:bgPr>
+    </p:bg>
+    <p:spTree>
+      <p:nvGrpSpPr>
+        <p:cNvPr id="1" name=""/>
+        <p:cNvGrpSpPr/>
+        <p:nvPr/>
+      </p:nvGrpSpPr>
+      <p:grpSpPr>
+        <a:xfrm>
+          <a:off x="0" y="0"/>
+          <a:ext cx="0" cy="0"/>
+          <a:chOff x="0" y="0"/>
+          <a:chExt cx="0" cy="0"/>
+        </a:xfrm>
+      </p:grpSpPr>
+      <p:pic>
+        <p:nvPicPr>
+          <p:cNvPr id="5" name="Picture 4">
+            <a:extLst>
+              <a:ext uri="{FF2B5EF4-FFF2-40B4-BE49-F238E27FC236}">
+                <a16:creationId xmlns:a16="http://schemas.microsoft.com/office/drawing/2014/main" id="{652F8266-5BD3-4F23-BA2F-15BA1184EB66}"/>
+              </a:ext>
+            </a:extLst>
+          </p:cNvPr>
+          <p:cNvPicPr>
+            <a:picLocks noChangeAspect="1"/>
+          </p:cNvPicPr>
+          <p:nvPr/>
+        </p:nvPicPr>
+        <p:blipFill>
+          <a:blip r:embed="rId4"/>
+          <a:stretch>
+            <a:fillRect/>
+          </a:stretch>
+        </p:blipFill>
+        <p:spPr>
+          <a:xfrm>
+            <a:off x="-1" y="1779752"/>
+            <a:ext cx="6036121" cy="3706648"/>
+          </a:xfrm>
+          <a:prstGeom prst="rect">
+            <a:avLst/>
+          </a:prstGeom>
+        </p:spPr>
+      </p:pic>
+      <p:pic>
+        <p:nvPicPr>
+          <p:cNvPr id="6" name="Picture 5">
+            <a:extLst>
+              <a:ext uri="{FF2B5EF4-FFF2-40B4-BE49-F238E27FC236}">
+                <a16:creationId xmlns:a16="http://schemas.microsoft.com/office/drawing/2014/main" id="{F288B351-D75D-453F-8177-F6AA0771636C}"/>
+              </a:ext>
+            </a:extLst>
+          </p:cNvPr>
+          <p:cNvPicPr>
+            <a:picLocks noChangeAspect="1"/>
+          </p:cNvPicPr>
+          <p:nvPr/>
+        </p:nvPicPr>
+        <p:blipFill>
+          <a:blip r:embed="rId5"/>
+          <a:stretch>
+            <a:fillRect/>
+          </a:stretch>
+        </p:blipFill>
+        <p:spPr>
+          <a:xfrm>
+            <a:off x="6036121" y="1779753"/>
+            <a:ext cx="6155879" cy="3706647"/>
+          </a:xfrm>
+          <a:prstGeom prst="rect">
+            <a:avLst/>
+          </a:prstGeom>
+        </p:spPr>
+      </p:pic>
+      <p:sp>
+        <p:nvSpPr>
+          <p:cNvPr id="7" name="Title 1">
+            <a:extLst>
+              <a:ext uri="{FF2B5EF4-FFF2-40B4-BE49-F238E27FC236}">
+                <a16:creationId xmlns:a16="http://schemas.microsoft.com/office/drawing/2014/main" id="{B4CE16BE-F643-4655-800E-73CA3E9B6384}"/>
+              </a:ext>
+            </a:extLst>
+          </p:cNvPr>
+          <p:cNvSpPr txBox="1">
+            <a:spLocks/>
+          </p:cNvSpPr>
+          <p:nvPr/>
+        </p:nvSpPr>
+        <p:spPr>
+          <a:xfrm>
+            <a:off x="838200" y="1"/>
+            <a:ext cx="10515600" cy="774439"/>
+          </a:xfrm>
+          <a:prstGeom prst="rect">
+            <a:avLst/>
+          </a:prstGeom>
+        </p:spPr>
+        <p:txBody>
+          <a:bodyPr>
+            <a:noAutofit/>
+          </a:bodyPr>
+          <a:lstStyle>
+            <a:lvl1pPr algn="l" defTabSz="914400" rtl="0" eaLnBrk="1" latinLnBrk="0" hangingPunct="1">
+              <a:lnSpc>
+                <a:spcPct val="90000"/>
+              </a:lnSpc>
+              <a:spcBef>
+                <a:spcPct val="0"/>
+              </a:spcBef>
+              <a:buNone/>
+              <a:defRPr sz="4400" kern="1200">
+                <a:solidFill>
+                  <a:schemeClr val="tx1"/>
+                </a:solidFill>
+                <a:latin typeface="+mj-lt"/>
+                <a:ea typeface="+mj-ea"/>
+                <a:cs typeface="+mj-cs"/>
+              </a:defRPr>
+            </a:lvl1pPr>
+          </a:lstStyle>
+          <a:p>
+            <a:pPr algn="ctr"/>
+            <a:r>
+              <a:rPr lang="en-US" dirty="0"/>
+              <a:t>Q: MORE GUNS = MORE SHOOTING?</a:t>
+            </a:r>
+          </a:p>
+        </p:txBody>
+      </p:sp>
+      <p:sp>
+        <p:nvSpPr>
+          <p:cNvPr id="8" name="Title 1">
+            <a:extLst>
+              <a:ext uri="{FF2B5EF4-FFF2-40B4-BE49-F238E27FC236}">
+                <a16:creationId xmlns:a16="http://schemas.microsoft.com/office/drawing/2014/main" id="{B23679A5-F176-437F-9098-77B138FECEB9}"/>
+              </a:ext>
+            </a:extLst>
+          </p:cNvPr>
+          <p:cNvSpPr txBox="1">
+            <a:spLocks/>
+          </p:cNvSpPr>
+          <p:nvPr/>
+        </p:nvSpPr>
+        <p:spPr>
+          <a:xfrm>
+            <a:off x="1950097" y="429210"/>
+            <a:ext cx="9049139" cy="1110342"/>
+          </a:xfrm>
+          <a:prstGeom prst="rect">
+            <a:avLst/>
+          </a:prstGeom>
+        </p:spPr>
+        <p:txBody>
+          <a:bodyPr vert="horz" lIns="91440" tIns="45720" rIns="91440" bIns="45720" rtlCol="0" anchor="ctr">
+            <a:noAutofit/>
+          </a:bodyPr>
+          <a:lstStyle>
+            <a:lvl1pPr algn="l" defTabSz="914400" rtl="0" eaLnBrk="1" latinLnBrk="0" hangingPunct="1">
+              <a:lnSpc>
+                <a:spcPct val="90000"/>
+              </a:lnSpc>
+              <a:spcBef>
+                <a:spcPct val="0"/>
+              </a:spcBef>
+              <a:buNone/>
+              <a:defRPr sz="4400" kern="1200">
+                <a:solidFill>
+                  <a:schemeClr val="tx1"/>
+                </a:solidFill>
+                <a:latin typeface="+mj-lt"/>
+                <a:ea typeface="+mj-ea"/>
+                <a:cs typeface="+mj-cs"/>
+              </a:defRPr>
+            </a:lvl1pPr>
+          </a:lstStyle>
+          <a:p>
+            <a:r>
+              <a:rPr lang="en-US" dirty="0"/>
+              <a:t>A: SUPRISINGLY, NOT EXACTLY</a:t>
+            </a:r>
+          </a:p>
+        </p:txBody>
+      </p:sp>
+    </p:spTree>
+    <p:extLst>
+      <p:ext uri="{BB962C8B-B14F-4D97-AF65-F5344CB8AC3E}">
+        <p14:creationId xmlns:p14="http://schemas.microsoft.com/office/powerpoint/2010/main" val="2107278466"/>
+      </p:ext>
+    </p:extLst>
+  </p:cSld>
+  <p:clrMapOvr>
+    <a:masterClrMapping/>
+  </p:clrMapOvr>
+  <p:timing>
+    <p:tnLst>
+      <p:par>
+        <p:cTn id="1" dur="indefinite" restart="never" nodeType="tmRoot">
+          <p:childTnLst>
+            <p:seq concurrent="1" nextAc="seek">
+              <p:cTn id="2" dur="indefinite" nodeType="mainSeq">
+                <p:childTnLst>
+                  <p:par>
+                    <p:cTn id="3" fill="hold">
+                      <p:stCondLst>
+                        <p:cond delay="indefinite"/>
+                        <p:cond evt="onBegin" delay="0">
+                          <p:tn val="2"/>
+                        </p:cond>
+                      </p:stCondLst>
+                      <p:childTnLst>
+                        <p:par>
+                          <p:cTn id="4" fill="hold">
+                            <p:stCondLst>
+                              <p:cond delay="0"/>
+                            </p:stCondLst>
+                            <p:childTnLst>
+                              <p:par>
+                                <p:cTn id="5" presetID="42" presetClass="entr" presetSubtype="0" fill="hold" grpId="0" nodeType="withEffect">
+                                  <p:stCondLst>
+                                    <p:cond delay="0"/>
+                                  </p:stCondLst>
+                                  <p:childTnLst>
+                                    <p:set>
+                                      <p:cBhvr>
+                                        <p:cTn id="6" dur="1" fill="hold">
+                                          <p:stCondLst>
+                                            <p:cond delay="0"/>
+                                          </p:stCondLst>
+                                        </p:cTn>
+                                        <p:tgtEl>
+                                          <p:spTgt spid="7"/>
+                                        </p:tgtEl>
+                                        <p:attrNameLst>
+                                          <p:attrName>style.visibility</p:attrName>
+                                        </p:attrNameLst>
+                                      </p:cBhvr>
+                                      <p:to>
+                                        <p:strVal val="visible"/>
+                                      </p:to>
+                                    </p:set>
+                                    <p:animEffect transition="in" filter="fade">
+                                      <p:cBhvr>
+                                        <p:cTn id="7" dur="1000"/>
+                                        <p:tgtEl>
+                                          <p:spTgt spid="7"/>
+                                        </p:tgtEl>
+                                      </p:cBhvr>
+                                    </p:animEffect>
+                                    <p:anim calcmode="lin" valueType="num">
+                                      <p:cBhvr>
+                                        <p:cTn id="8" dur="1000" fill="hold"/>
+                                        <p:tgtEl>
+                                          <p:spTgt spid="7"/>
+                                        </p:tgtEl>
+                                        <p:attrNameLst>
+                                          <p:attrName>ppt_x</p:attrName>
+                                        </p:attrNameLst>
+                                      </p:cBhvr>
+                                      <p:tavLst>
+                                        <p:tav tm="0">
+                                          <p:val>
+                                            <p:strVal val="#ppt_x"/>
+                                          </p:val>
+                                        </p:tav>
+                                        <p:tav tm="100000">
+                                          <p:val>
+                                            <p:strVal val="#ppt_x"/>
+                                          </p:val>
+                                        </p:tav>
+                                      </p:tavLst>
+                                    </p:anim>
+                                    <p:anim calcmode="lin" valueType="num">
+                                      <p:cBhvr>
+                                        <p:cTn id="9" dur="1000" fill="hold"/>
+                                        <p:tgtEl>
+                                          <p:spTgt spid="7"/>
+                                        </p:tgtEl>
+                                        <p:attrNameLst>
+                                          <p:attrName>ppt_y</p:attrName>
+                                        </p:attrNameLst>
+                                      </p:cBhvr>
+                                      <p:tavLst>
+                                        <p:tav tm="0">
+                                          <p:val>
+                                            <p:strVal val="#ppt_y+.1"/>
+                                          </p:val>
+                                        </p:tav>
+                                        <p:tav tm="100000">
+                                          <p:val>
+                                            <p:strVal val="#ppt_y"/>
+                                          </p:val>
+                                        </p:tav>
+                                      </p:tavLst>
+                                    </p:anim>
+                                  </p:childTnLst>
+                                </p:cTn>
+                              </p:par>
+                            </p:childTnLst>
+                          </p:cTn>
+                        </p:par>
+                      </p:childTnLst>
+                    </p:cTn>
+                  </p:par>
+                  <p:par>
+                    <p:cTn id="10" fill="hold">
+                      <p:stCondLst>
+                        <p:cond delay="indefinite"/>
+                      </p:stCondLst>
+                      <p:childTnLst>
+                        <p:par>
+                          <p:cTn id="11" fill="hold">
+                            <p:stCondLst>
+                              <p:cond delay="0"/>
+                            </p:stCondLst>
+                            <p:childTnLst>
+                              <p:par>
+                                <p:cTn id="12" presetID="42" presetClass="entr" presetSubtype="0" fill="hold" grpId="0" nodeType="clickEffect">
+                                  <p:stCondLst>
+                                    <p:cond delay="0"/>
+                                  </p:stCondLst>
+                                  <p:childTnLst>
+                                    <p:set>
+                                      <p:cBhvr>
+                                        <p:cTn id="13" dur="1" fill="hold">
+                                          <p:stCondLst>
+                                            <p:cond delay="0"/>
+                                          </p:stCondLst>
+                                        </p:cTn>
+                                        <p:tgtEl>
+                                          <p:spTgt spid="8"/>
+                                        </p:tgtEl>
+                                        <p:attrNameLst>
+                                          <p:attrName>style.visibility</p:attrName>
+                                        </p:attrNameLst>
+                                      </p:cBhvr>
+                                      <p:to>
+                                        <p:strVal val="visible"/>
+                                      </p:to>
+                                    </p:set>
+                                    <p:animEffect transition="in" filter="fade">
+                                      <p:cBhvr>
+                                        <p:cTn id="14" dur="1000"/>
+                                        <p:tgtEl>
+                                          <p:spTgt spid="8"/>
+                                        </p:tgtEl>
+                                      </p:cBhvr>
+                                    </p:animEffect>
+                                    <p:anim calcmode="lin" valueType="num">
+                                      <p:cBhvr>
+                                        <p:cTn id="15" dur="1000" fill="hold"/>
+                                        <p:tgtEl>
+                                          <p:spTgt spid="8"/>
+                                        </p:tgtEl>
+                                        <p:attrNameLst>
+                                          <p:attrName>ppt_x</p:attrName>
+                                        </p:attrNameLst>
+                                      </p:cBhvr>
+                                      <p:tavLst>
+                                        <p:tav tm="0">
+                                          <p:val>
+                                            <p:strVal val="#ppt_x"/>
+                                          </p:val>
+                                        </p:tav>
+                                        <p:tav tm="100000">
+                                          <p:val>
+                                            <p:strVal val="#ppt_x"/>
+                                          </p:val>
+                                        </p:tav>
+                                      </p:tavLst>
+                                    </p:anim>
+                                    <p:anim calcmode="lin" valueType="num">
+                                      <p:cBhvr>
+                                        <p:cTn id="16" dur="1000" fill="hold"/>
+                                        <p:tgtEl>
+                                          <p:spTgt spid="8"/>
+                                        </p:tgtEl>
+                                        <p:attrNameLst>
+                                          <p:attrName>ppt_y</p:attrName>
+                                        </p:attrNameLst>
+                                      </p:cBhvr>
+                                      <p:tavLst>
+                                        <p:tav tm="0">
+                                          <p:val>
+                                            <p:strVal val="#ppt_y+.1"/>
+                                          </p:val>
+                                        </p:tav>
+                                        <p:tav tm="100000">
+                                          <p:val>
+                                            <p:strVal val="#ppt_y"/>
+                                          </p:val>
+                                        </p:tav>
+                                      </p:tavLst>
+                                    </p:anim>
+                                  </p:childTnLst>
+                                </p:cTn>
+                              </p:par>
+                            </p:childTnLst>
+                          </p:cTn>
+                        </p:par>
+                        <p:par>
+                          <p:cTn id="17" fill="hold">
+                            <p:stCondLst>
+                              <p:cond delay="1000"/>
+                            </p:stCondLst>
+                            <p:childTnLst>
+                              <p:par>
+                                <p:cTn id="18" presetID="2" presetClass="entr" presetSubtype="8" fill="hold" nodeType="afterEffect">
+                                  <p:stCondLst>
+                                    <p:cond delay="750"/>
+                                  </p:stCondLst>
+                                  <p:childTnLst>
+                                    <p:set>
+                                      <p:cBhvr>
+                                        <p:cTn id="19" dur="1" fill="hold">
+                                          <p:stCondLst>
+                                            <p:cond delay="0"/>
+                                          </p:stCondLst>
+                                        </p:cTn>
+                                        <p:tgtEl>
+                                          <p:spTgt spid="5"/>
+                                        </p:tgtEl>
+                                        <p:attrNameLst>
+                                          <p:attrName>style.visibility</p:attrName>
+                                        </p:attrNameLst>
+                                      </p:cBhvr>
+                                      <p:to>
+                                        <p:strVal val="visible"/>
+                                      </p:to>
+                                    </p:set>
+                                    <p:anim calcmode="lin" valueType="num">
+                                      <p:cBhvr additive="base">
+                                        <p:cTn id="20" dur="500" fill="hold"/>
+                                        <p:tgtEl>
+                                          <p:spTgt spid="5"/>
+                                        </p:tgtEl>
+                                        <p:attrNameLst>
+                                          <p:attrName>ppt_x</p:attrName>
+                                        </p:attrNameLst>
+                                      </p:cBhvr>
+                                      <p:tavLst>
+                                        <p:tav tm="0">
+                                          <p:val>
+                                            <p:strVal val="0-#ppt_w/2"/>
+                                          </p:val>
+                                        </p:tav>
+                                        <p:tav tm="100000">
+                                          <p:val>
+                                            <p:strVal val="#ppt_x"/>
+                                          </p:val>
+                                        </p:tav>
+                                      </p:tavLst>
+                                    </p:anim>
+                                    <p:anim calcmode="lin" valueType="num">
+                                      <p:cBhvr additive="base">
+                                        <p:cTn id="21" dur="500" fill="hold"/>
+                                        <p:tgtEl>
+                                          <p:spTgt spid="5"/>
+                                        </p:tgtEl>
+                                        <p:attrNameLst>
+                                          <p:attrName>ppt_y</p:attrName>
+                                        </p:attrNameLst>
+                                      </p:cBhvr>
+                                      <p:tavLst>
+                                        <p:tav tm="0">
+                                          <p:val>
+                                            <p:strVal val="#ppt_y"/>
+                                          </p:val>
+                                        </p:tav>
+                                        <p:tav tm="100000">
+                                          <p:val>
+                                            <p:strVal val="#ppt_y"/>
+                                          </p:val>
+                                        </p:tav>
+                                      </p:tavLst>
+                                    </p:anim>
+                                  </p:childTnLst>
+                                </p:cTn>
+                              </p:par>
+                              <p:par>
+                                <p:cTn id="22" presetID="2" presetClass="entr" presetSubtype="2" fill="hold" nodeType="withEffect">
+                                  <p:stCondLst>
+                                    <p:cond delay="750"/>
+                                  </p:stCondLst>
+                                  <p:childTnLst>
+                                    <p:set>
+                                      <p:cBhvr>
+                                        <p:cTn id="23" dur="1" fill="hold">
+                                          <p:stCondLst>
+                                            <p:cond delay="0"/>
+                                          </p:stCondLst>
+                                        </p:cTn>
+                                        <p:tgtEl>
+                                          <p:spTgt spid="6"/>
+                                        </p:tgtEl>
+                                        <p:attrNameLst>
+                                          <p:attrName>style.visibility</p:attrName>
+                                        </p:attrNameLst>
+                                      </p:cBhvr>
+                                      <p:to>
+                                        <p:strVal val="visible"/>
+                                      </p:to>
+                                    </p:set>
+                                    <p:anim calcmode="lin" valueType="num">
+                                      <p:cBhvr additive="base">
+                                        <p:cTn id="24" dur="500" fill="hold"/>
+                                        <p:tgtEl>
+                                          <p:spTgt spid="6"/>
+                                        </p:tgtEl>
+                                        <p:attrNameLst>
+                                          <p:attrName>ppt_x</p:attrName>
+                                        </p:attrNameLst>
+                                      </p:cBhvr>
+                                      <p:tavLst>
+                                        <p:tav tm="0">
+                                          <p:val>
+                                            <p:strVal val="1+#ppt_w/2"/>
+                                          </p:val>
+                                        </p:tav>
+                                        <p:tav tm="100000">
+                                          <p:val>
+                                            <p:strVal val="#ppt_x"/>
+                                          </p:val>
+                                        </p:tav>
+                                      </p:tavLst>
+                                    </p:anim>
+                                    <p:anim calcmode="lin" valueType="num">
+                                      <p:cBhvr additive="base">
+                                        <p:cTn id="25" dur="500" fill="hold"/>
+                                        <p:tgtEl>
+                                          <p:spTgt spid="6"/>
+                                        </p:tgtEl>
+                                        <p:attrNameLst>
+                                          <p:attrName>ppt_y</p:attrName>
+                                        </p:attrNameLst>
+                                      </p:cBhvr>
+                                      <p:tavLst>
+                                        <p:tav tm="0">
+                                          <p:val>
+                                            <p:strVal val="#ppt_y"/>
+                                          </p:val>
+                                        </p:tav>
+                                        <p:tav tm="100000">
+                                          <p:val>
+                                            <p:strVal val="#ppt_y"/>
+                                          </p:val>
+                                        </p:tav>
+                                      </p:tavLst>
+                                    </p:anim>
+                                  </p:childTnLst>
+                                </p:cTn>
+                              </p:par>
+                            </p:childTnLst>
+                          </p:cTn>
+                        </p:par>
+                      </p:childTnLst>
+                    </p:cTn>
+                  </p:par>
+                </p:childTnLst>
+              </p:cTn>
+              <p:prevCondLst>
+                <p:cond evt="onPrev" delay="0">
+                  <p:tgtEl>
+                    <p:sldTgt/>
+                  </p:tgtEl>
+                </p:cond>
+              </p:prevCondLst>
+              <p:nextCondLst>
+                <p:cond evt="onNext" delay="0">
+                  <p:tgtEl>
+                    <p:sldTgt/>
+                  </p:tgtEl>
+                </p:cond>
+              </p:nextCondLst>
+            </p:seq>
+          </p:childTnLst>
+        </p:cTn>
+      </p:par>
+    </p:tnLst>
+    <p:bldLst>
+      <p:bldP spid="7" grpId="0"/>
+      <p:bldP spid="8" grpId="0"/>
+    </p:bldLst>
+  </p:timing>
+</p:sld>
+</file>
+
+<file path=ppt/slides/slide12.xml><?xml version="1.0" encoding="utf-8"?>
+<p:sld xmlns:a="http://schemas.openxmlformats.org/drawingml/2006/main" xmlns:r="http://schemas.openxmlformats.org/officeDocument/2006/relationships" xmlns:p="http://schemas.openxmlformats.org/presentationml/2006/main">
+  <p:cSld>
+    <p:bg>
+      <p:bgPr>
+        <a:blipFill dpi="0" rotWithShape="1">
+          <a:blip r:embed="rId3">
             <a:lum/>
           </a:blip>
           <a:srcRect/>
@@ -6369,7 +7276,7 @@
           </p:nvPr>
         </p:nvPicPr>
         <p:blipFill>
-          <a:blip r:embed="rId3">
+          <a:blip r:embed="rId4">
             <a:extLst>
               <a:ext uri="{28A0092B-C50C-407E-A947-70E740481C1C}">
                 <a14:useLocalDpi xmlns:a14="http://schemas.microsoft.com/office/drawing/2010/main" val="0"/>
@@ -6404,7 +7311,7 @@
           </p:nvPr>
         </p:nvPicPr>
         <p:blipFill>
-          <a:blip r:embed="rId4">
+          <a:blip r:embed="rId5">
             <a:extLst>
               <a:ext uri="{28A0092B-C50C-407E-A947-70E740481C1C}">
                 <a14:useLocalDpi xmlns:a14="http://schemas.microsoft.com/office/drawing/2010/main" val="0"/>
@@ -6437,7 +7344,7 @@
           <p:nvPr/>
         </p:nvPicPr>
         <p:blipFill>
-          <a:blip r:embed="rId5">
+          <a:blip r:embed="rId6">
             <a:extLst>
               <a:ext uri="{28A0092B-C50C-407E-A947-70E740481C1C}">
                 <a14:useLocalDpi xmlns:a14="http://schemas.microsoft.com/office/drawing/2010/main" val="0"/>
@@ -7174,7 +8081,7 @@
 </p:sld>
 </file>
 
-<file path=ppt/slides/slide12.xml><?xml version="1.0" encoding="utf-8"?>
+<file path=ppt/slides/slide13.xml><?xml version="1.0" encoding="utf-8"?>
 <p:sld xmlns:a="http://schemas.openxmlformats.org/drawingml/2006/main" xmlns:r="http://schemas.openxmlformats.org/officeDocument/2006/relationships" xmlns:p="http://schemas.openxmlformats.org/presentationml/2006/main">
   <p:cSld>
     <p:bg>
@@ -11692,7 +12599,7 @@
 </p:sld>
 </file>
 
-<file path=ppt/slides/slide13.xml><?xml version="1.0" encoding="utf-8"?>
+<file path=ppt/slides/slide14.xml><?xml version="1.0" encoding="utf-8"?>
 <p:sld xmlns:a="http://schemas.openxmlformats.org/drawingml/2006/main" xmlns:r="http://schemas.openxmlformats.org/officeDocument/2006/relationships" xmlns:p="http://schemas.openxmlformats.org/presentationml/2006/main">
   <p:cSld>
     <p:bg>
@@ -12361,7 +13268,7 @@
 </p:sld>
 </file>
 
-<file path=ppt/slides/slide14.xml><?xml version="1.0" encoding="utf-8"?>
+<file path=ppt/slides/slide15.xml><?xml version="1.0" encoding="utf-8"?>
 <p:sld xmlns:a="http://schemas.openxmlformats.org/drawingml/2006/main" xmlns:r="http://schemas.openxmlformats.org/officeDocument/2006/relationships" xmlns:p="http://schemas.openxmlformats.org/presentationml/2006/main">
   <p:cSld>
     <p:bg>
@@ -13881,7 +14788,7 @@
 </p:sld>
 </file>
 
-<file path=ppt/slides/slide15.xml><?xml version="1.0" encoding="utf-8"?>
+<file path=ppt/slides/slide16.xml><?xml version="1.0" encoding="utf-8"?>
 <p:sld xmlns:a="http://schemas.openxmlformats.org/drawingml/2006/main" xmlns:r="http://schemas.openxmlformats.org/officeDocument/2006/relationships" xmlns:p="http://schemas.openxmlformats.org/presentationml/2006/main">
   <p:cSld>
     <p:bg>
@@ -14649,7 +15556,7 @@
 </p:sld>
 </file>
 
-<file path=ppt/slides/slide16.xml><?xml version="1.0" encoding="utf-8"?>
+<file path=ppt/slides/slide17.xml><?xml version="1.0" encoding="utf-8"?>
 <p:sld xmlns:a="http://schemas.openxmlformats.org/drawingml/2006/main" xmlns:r="http://schemas.openxmlformats.org/officeDocument/2006/relationships" xmlns:p="http://schemas.openxmlformats.org/presentationml/2006/main">
   <p:cSld>
     <p:bg>
@@ -18736,10 +19643,10 @@
         </p:nvGrpSpPr>
         <p:grpSpPr>
           <a:xfrm>
-            <a:off x="297023" y="2998241"/>
-            <a:ext cx="11422225" cy="1693241"/>
-            <a:chOff x="297023" y="2998241"/>
-            <a:chExt cx="11422225" cy="1693241"/>
+            <a:off x="297024" y="2998241"/>
+            <a:ext cx="11510087" cy="1701148"/>
+            <a:chOff x="297024" y="2998241"/>
+            <a:chExt cx="11510087" cy="1701148"/>
           </a:xfrm>
         </p:grpSpPr>
         <p:sp>
@@ -18803,7 +19710,7 @@
           </p:nvSpPr>
           <p:spPr>
             <a:xfrm>
-              <a:off x="297023" y="3503613"/>
+              <a:off x="384886" y="3541874"/>
               <a:ext cx="11422225" cy="830997"/>
             </a:xfrm>
             <a:prstGeom prst="rect">
@@ -19237,7 +20144,7 @@
                   </a:solidFill>
                   <a:latin typeface="Consolas" panose="020B0609020204030204" pitchFamily="49" charset="0"/>
                 </a:rPr>
-                <a:t> </a:t>
+                <a:t> for </a:t>
               </a:r>
               <a:r>
                 <a:rPr lang="en-US" sz="1200" dirty="0">
@@ -19273,7 +20180,7 @@
                   </a:solidFill>
                   <a:latin typeface="Consolas" panose="020B0609020204030204" pitchFamily="49" charset="0"/>
                 </a:rPr>
-                <a:t> more knows that the type of the gun is unknown'</a:t>
+                <a:t> more we know that the type of the gun is unknown'</a:t>
               </a:r>
               <a:r>
                 <a:rPr lang="en-US" sz="1200" dirty="0">
@@ -19310,8 +20217,8 @@
           </p:nvSpPr>
           <p:spPr bwMode="auto">
             <a:xfrm>
-              <a:off x="398106" y="4479886"/>
-              <a:ext cx="9178795" cy="211596"/>
+              <a:off x="382651" y="4487793"/>
+              <a:ext cx="9948236" cy="211596"/>
             </a:xfrm>
             <a:prstGeom prst="rect">
               <a:avLst/>
@@ -19381,7 +20288,7 @@
                   <a:effectLst/>
                   <a:latin typeface="Courier New" panose="02070309020205020404" pitchFamily="49" charset="0"/>
                 </a:rPr>
-                <a:t> Out of 239677 incidents 99451 have no data on gun type at all and 93559 more knows that the type of the gun is unknown</a:t>
+                <a:t> Out of 239677 incidents 99451 have no data on gun type at all and for 93559 more we know that the type of the gun is unknown</a:t>
               </a:r>
               <a:r>
                 <a:rPr kumimoji="0" lang="en-US" altLang="en-US" sz="800" b="0" i="0" u="none" strike="noStrike" cap="none" normalizeH="0" baseline="0" dirty="0">
@@ -27335,76 +28242,6 @@
       </p:grpSpPr>
       <p:pic>
         <p:nvPicPr>
-          <p:cNvPr id="2" name="Picture 1"/>
-          <p:cNvPicPr>
-            <a:picLocks noChangeAspect="1"/>
-          </p:cNvPicPr>
-          <p:nvPr/>
-        </p:nvPicPr>
-        <p:blipFill>
-          <a:blip r:embed="rId4">
-            <a:extLst>
-              <a:ext uri="{28A0092B-C50C-407E-A947-70E740481C1C}">
-                <a14:useLocalDpi xmlns:a14="http://schemas.microsoft.com/office/drawing/2010/main" val="0"/>
-              </a:ext>
-            </a:extLst>
-          </a:blip>
-          <a:stretch>
-            <a:fillRect/>
-          </a:stretch>
-        </p:blipFill>
-        <p:spPr>
-          <a:xfrm>
-            <a:off x="72521" y="1386067"/>
-            <a:ext cx="12060142" cy="2512529"/>
-          </a:xfrm>
-          <a:prstGeom prst="rect">
-            <a:avLst/>
-          </a:prstGeom>
-          <a:ln>
-            <a:solidFill>
-              <a:schemeClr val="tx1"/>
-            </a:solidFill>
-          </a:ln>
-        </p:spPr>
-      </p:pic>
-      <p:pic>
-        <p:nvPicPr>
-          <p:cNvPr id="3" name="Picture 2"/>
-          <p:cNvPicPr>
-            <a:picLocks noChangeAspect="1"/>
-          </p:cNvPicPr>
-          <p:nvPr/>
-        </p:nvPicPr>
-        <p:blipFill>
-          <a:blip r:embed="rId5">
-            <a:extLst>
-              <a:ext uri="{28A0092B-C50C-407E-A947-70E740481C1C}">
-                <a14:useLocalDpi xmlns:a14="http://schemas.microsoft.com/office/drawing/2010/main" val="0"/>
-              </a:ext>
-            </a:extLst>
-          </a:blip>
-          <a:stretch>
-            <a:fillRect/>
-          </a:stretch>
-        </p:blipFill>
-        <p:spPr>
-          <a:xfrm>
-            <a:off x="47071" y="4174322"/>
-            <a:ext cx="12096456" cy="2199355"/>
-          </a:xfrm>
-          <a:prstGeom prst="rect">
-            <a:avLst/>
-          </a:prstGeom>
-          <a:ln>
-            <a:solidFill>
-              <a:schemeClr val="tx1"/>
-            </a:solidFill>
-          </a:ln>
-        </p:spPr>
-      </p:pic>
-      <p:pic>
-        <p:nvPicPr>
           <p:cNvPr id="7" name="Picture 6"/>
           <p:cNvPicPr>
             <a:picLocks noChangeAspect="1"/>
@@ -27412,7 +28249,7 @@
           <p:nvPr/>
         </p:nvPicPr>
         <p:blipFill>
-          <a:blip r:embed="rId6"/>
+          <a:blip r:embed="rId4"/>
           <a:stretch>
             <a:fillRect/>
           </a:stretch>
@@ -27484,6 +28321,78 @@
           </a:p>
         </p:txBody>
       </p:sp>
+      <p:pic>
+        <p:nvPicPr>
+          <p:cNvPr id="9" name="Picture 8">
+            <a:extLst>
+              <a:ext uri="{FF2B5EF4-FFF2-40B4-BE49-F238E27FC236}">
+                <a16:creationId xmlns:a16="http://schemas.microsoft.com/office/drawing/2014/main" id="{59AEFF44-6074-4558-BC76-D139B03CE62D}"/>
+              </a:ext>
+            </a:extLst>
+          </p:cNvPr>
+          <p:cNvPicPr>
+            <a:picLocks noChangeAspect="1"/>
+          </p:cNvPicPr>
+          <p:nvPr/>
+        </p:nvPicPr>
+        <p:blipFill>
+          <a:blip r:embed="rId5">
+            <a:extLst>
+              <a:ext uri="{28A0092B-C50C-407E-A947-70E740481C1C}">
+                <a14:useLocalDpi xmlns:a14="http://schemas.microsoft.com/office/drawing/2010/main" val="0"/>
+              </a:ext>
+            </a:extLst>
+          </a:blip>
+          <a:stretch>
+            <a:fillRect/>
+          </a:stretch>
+        </p:blipFill>
+        <p:spPr>
+          <a:xfrm>
+            <a:off x="4580" y="1437969"/>
+            <a:ext cx="12187420" cy="2636086"/>
+          </a:xfrm>
+          <a:prstGeom prst="rect">
+            <a:avLst/>
+          </a:prstGeom>
+        </p:spPr>
+      </p:pic>
+      <p:pic>
+        <p:nvPicPr>
+          <p:cNvPr id="10" name="Picture 9">
+            <a:extLst>
+              <a:ext uri="{FF2B5EF4-FFF2-40B4-BE49-F238E27FC236}">
+                <a16:creationId xmlns:a16="http://schemas.microsoft.com/office/drawing/2014/main" id="{69EC3301-4C33-4851-90D8-AABBD231FFD7}"/>
+              </a:ext>
+            </a:extLst>
+          </p:cNvPr>
+          <p:cNvPicPr>
+            <a:picLocks noChangeAspect="1"/>
+          </p:cNvPicPr>
+          <p:nvPr/>
+        </p:nvPicPr>
+        <p:blipFill>
+          <a:blip r:embed="rId6">
+            <a:extLst>
+              <a:ext uri="{28A0092B-C50C-407E-A947-70E740481C1C}">
+                <a14:useLocalDpi xmlns:a14="http://schemas.microsoft.com/office/drawing/2010/main" val="0"/>
+              </a:ext>
+            </a:extLst>
+          </a:blip>
+          <a:stretch>
+            <a:fillRect/>
+          </a:stretch>
+        </p:blipFill>
+        <p:spPr>
+          <a:xfrm>
+            <a:off x="4580" y="4151599"/>
+            <a:ext cx="12187420" cy="2611590"/>
+          </a:xfrm>
+          <a:prstGeom prst="rect">
+            <a:avLst/>
+          </a:prstGeom>
+        </p:spPr>
+      </p:pic>
     </p:spTree>
     <p:extLst>
       <p:ext uri="{BB962C8B-B14F-4D97-AF65-F5344CB8AC3E}">
@@ -27590,21 +28499,30 @@
                                   </p:childTnLst>
                                 </p:cTn>
                               </p:par>
+                            </p:childTnLst>
+                          </p:cTn>
+                        </p:par>
+                        <p:par>
+                          <p:cTn id="9" fill="hold">
+                            <p:stCondLst>
+                              <p:cond delay="500"/>
+                            </p:stCondLst>
+                            <p:childTnLst>
                               <p:par>
-                                <p:cTn id="9" presetID="2" presetClass="entr" presetSubtype="8" fill="hold" nodeType="withEffect">
+                                <p:cTn id="10" presetID="2" presetClass="entr" presetSubtype="8" fill="hold" nodeType="afterEffect">
                                   <p:stCondLst>
-                                    <p:cond delay="1000"/>
+                                    <p:cond delay="500"/>
                                   </p:stCondLst>
                                   <p:childTnLst>
                                     <p:set>
                                       <p:cBhvr>
-                                        <p:cTn id="10" dur="1" fill="hold">
+                                        <p:cTn id="11" dur="1" fill="hold">
                                           <p:stCondLst>
                                             <p:cond delay="0"/>
                                           </p:stCondLst>
                                         </p:cTn>
                                         <p:tgtEl>
-                                          <p:spTgt spid="2"/>
+                                          <p:spTgt spid="9"/>
                                         </p:tgtEl>
                                         <p:attrNameLst>
                                           <p:attrName>style.visibility</p:attrName>
@@ -27616,9 +28534,9 @@
                                     </p:set>
                                     <p:anim calcmode="lin" valueType="num">
                                       <p:cBhvr additive="base">
-                                        <p:cTn id="11" dur="500" fill="hold"/>
-                                        <p:tgtEl>
-                                          <p:spTgt spid="2"/>
+                                        <p:cTn id="12" dur="500" fill="hold"/>
+                                        <p:tgtEl>
+                                          <p:spTgt spid="9"/>
                                         </p:tgtEl>
                                         <p:attrNameLst>
                                           <p:attrName>ppt_x</p:attrName>
@@ -27639,9 +28557,9 @@
                                     </p:anim>
                                     <p:anim calcmode="lin" valueType="num">
                                       <p:cBhvr additive="base">
-                                        <p:cTn id="12" dur="500" fill="hold"/>
-                                        <p:tgtEl>
-                                          <p:spTgt spid="2"/>
+                                        <p:cTn id="13" dur="500" fill="hold"/>
+                                        <p:tgtEl>
+                                          <p:spTgt spid="9"/>
                                         </p:tgtEl>
                                         <p:attrNameLst>
                                           <p:attrName>ppt_y</p:attrName>
@@ -27664,20 +28582,20 @@
                                 </p:cTn>
                               </p:par>
                               <p:par>
-                                <p:cTn id="13" presetID="2" presetClass="entr" presetSubtype="2" fill="hold" nodeType="withEffect">
+                                <p:cTn id="14" presetID="2" presetClass="entr" presetSubtype="2" fill="hold" nodeType="withEffect">
                                   <p:stCondLst>
-                                    <p:cond delay="1250"/>
+                                    <p:cond delay="500"/>
                                   </p:stCondLst>
                                   <p:childTnLst>
                                     <p:set>
                                       <p:cBhvr>
-                                        <p:cTn id="14" dur="1" fill="hold">
+                                        <p:cTn id="15" dur="1" fill="hold">
                                           <p:stCondLst>
                                             <p:cond delay="0"/>
                                           </p:stCondLst>
                                         </p:cTn>
                                         <p:tgtEl>
-                                          <p:spTgt spid="3"/>
+                                          <p:spTgt spid="10"/>
                                         </p:tgtEl>
                                         <p:attrNameLst>
                                           <p:attrName>style.visibility</p:attrName>
@@ -27689,9 +28607,9 @@
                                     </p:set>
                                     <p:anim calcmode="lin" valueType="num">
                                       <p:cBhvr additive="base">
-                                        <p:cTn id="15" dur="500" fill="hold"/>
-                                        <p:tgtEl>
-                                          <p:spTgt spid="3"/>
+                                        <p:cTn id="16" dur="500" fill="hold"/>
+                                        <p:tgtEl>
+                                          <p:spTgt spid="10"/>
                                         </p:tgtEl>
                                         <p:attrNameLst>
                                           <p:attrName>ppt_x</p:attrName>
@@ -27712,9 +28630,9 @@
                                     </p:anim>
                                     <p:anim calcmode="lin" valueType="num">
                                       <p:cBhvr additive="base">
-                                        <p:cTn id="16" dur="500" fill="hold"/>
-                                        <p:tgtEl>
-                                          <p:spTgt spid="3"/>
+                                        <p:cTn id="17" dur="500" fill="hold"/>
+                                        <p:tgtEl>
+                                          <p:spTgt spid="10"/>
                                         </p:tgtEl>
                                         <p:attrNameLst>
                                           <p:attrName>ppt_y</p:attrName>
@@ -27736,19 +28654,10 @@
                                   </p:childTnLst>
                                 </p:cTn>
                               </p:par>
-                            </p:childTnLst>
-                          </p:cTn>
-                        </p:par>
-                        <p:par>
-                          <p:cTn id="17" fill="hold">
-                            <p:stCondLst>
-                              <p:cond delay="1750"/>
-                            </p:stCondLst>
-                            <p:childTnLst>
                               <p:par>
-                                <p:cTn id="18" presetID="2" presetClass="entr" presetSubtype="1" fill="hold" nodeType="afterEffect">
+                                <p:cTn id="18" presetID="2" presetClass="entr" presetSubtype="1" fill="hold" nodeType="withEffect">
                                   <p:stCondLst>
-                                    <p:cond delay="250"/>
+                                    <p:cond delay="500"/>
                                   </p:stCondLst>
                                   <p:childTnLst>
                                     <p:set>
@@ -27771,7 +28680,7 @@
                                     </p:set>
                                     <p:anim calcmode="lin" valueType="num">
                                       <p:cBhvr additive="base">
-                                        <p:cTn id="20" dur="500" fill="hold"/>
+                                        <p:cTn id="20" dur="750" fill="hold"/>
                                         <p:tgtEl>
                                           <p:spTgt spid="7"/>
                                         </p:tgtEl>
@@ -27794,7 +28703,7 @@
                                     </p:anim>
                                     <p:anim calcmode="lin" valueType="num">
                                       <p:cBhvr additive="base">
-                                        <p:cTn id="21" dur="500" fill="hold"/>
+                                        <p:cTn id="21" dur="750" fill="hold"/>
                                         <p:tgtEl>
                                           <p:spTgt spid="7"/>
                                         </p:tgtEl>

</xml_diff>

<commit_message>
Re-organized the slides and updated the gun-laws chart
</commit_message>
<xml_diff>
--- a/Presentation/Gun Violence.pptx
+++ b/Presentation/Gun Violence.pptx
@@ -14,11 +14,11 @@
     <p:sldId id="259" r:id="rId5"/>
     <p:sldId id="271" r:id="rId6"/>
     <p:sldId id="260" r:id="rId7"/>
-    <p:sldId id="267" r:id="rId8"/>
-    <p:sldId id="261" r:id="rId9"/>
-    <p:sldId id="268" r:id="rId10"/>
-    <p:sldId id="269" r:id="rId11"/>
-    <p:sldId id="273" r:id="rId12"/>
+    <p:sldId id="273" r:id="rId8"/>
+    <p:sldId id="267" r:id="rId9"/>
+    <p:sldId id="261" r:id="rId10"/>
+    <p:sldId id="268" r:id="rId11"/>
+    <p:sldId id="269" r:id="rId12"/>
     <p:sldId id="266" r:id="rId13"/>
     <p:sldId id="262" r:id="rId14"/>
     <p:sldId id="263" r:id="rId15"/>
@@ -637,6 +637,263 @@
           <a:p>
             <a:r>
               <a:rPr lang="en-US" b="1" dirty="0"/>
+              <a:t>Top States from 14 to 17: </a:t>
+            </a:r>
+            <a:r>
+              <a:rPr lang="en-US" dirty="0"/>
+              <a:t>DC, Alaska, Delaware, Louisiana, </a:t>
+            </a:r>
+          </a:p>
+          <a:p>
+            <a:r>
+              <a:rPr lang="en-US" b="1" dirty="0"/>
+              <a:t>Bottom States 14 to 17:  </a:t>
+            </a:r>
+            <a:r>
+              <a:rPr lang="en-US" sz="1200" b="0" i="0" u="none" strike="noStrike" kern="1200" dirty="0">
+                <a:solidFill>
+                  <a:schemeClr val="tx1"/>
+                </a:solidFill>
+                <a:effectLst/>
+                <a:latin typeface="+mn-lt"/>
+                <a:ea typeface="+mn-ea"/>
+                <a:cs typeface="+mn-cs"/>
+              </a:rPr>
+              <a:t>California</a:t>
+            </a:r>
+            <a:r>
+              <a:rPr lang="en-US" b="0" dirty="0"/>
+              <a:t> </a:t>
+            </a:r>
+            <a:r>
+              <a:rPr lang="en-US" sz="1200" b="0" i="0" u="none" strike="noStrike" kern="1200" dirty="0">
+                <a:solidFill>
+                  <a:schemeClr val="tx1"/>
+                </a:solidFill>
+                <a:effectLst/>
+                <a:latin typeface="+mn-lt"/>
+                <a:ea typeface="+mn-ea"/>
+                <a:cs typeface="+mn-cs"/>
+              </a:rPr>
+              <a:t>Colorado</a:t>
+            </a:r>
+            <a:r>
+              <a:rPr lang="en-US" b="0" dirty="0"/>
+              <a:t> </a:t>
+            </a:r>
+            <a:r>
+              <a:rPr lang="en-US" sz="1200" b="0" i="0" u="none" strike="noStrike" kern="1200" dirty="0">
+                <a:solidFill>
+                  <a:schemeClr val="tx1"/>
+                </a:solidFill>
+                <a:effectLst/>
+                <a:latin typeface="+mn-lt"/>
+                <a:ea typeface="+mn-ea"/>
+                <a:cs typeface="+mn-cs"/>
+              </a:rPr>
+              <a:t>Hawaii</a:t>
+            </a:r>
+            <a:r>
+              <a:rPr lang="en-US" b="0" dirty="0"/>
+              <a:t> </a:t>
+            </a:r>
+            <a:r>
+              <a:rPr lang="en-US" sz="1200" b="0" i="0" u="none" strike="noStrike" kern="1200" dirty="0">
+                <a:solidFill>
+                  <a:schemeClr val="tx1"/>
+                </a:solidFill>
+                <a:effectLst/>
+                <a:latin typeface="+mn-lt"/>
+                <a:ea typeface="+mn-ea"/>
+                <a:cs typeface="+mn-cs"/>
+              </a:rPr>
+              <a:t>Idaho</a:t>
+            </a:r>
+            <a:r>
+              <a:rPr lang="en-US" b="0" dirty="0"/>
+              <a:t> </a:t>
+            </a:r>
+            <a:r>
+              <a:rPr lang="en-US" sz="1200" b="0" i="0" u="none" strike="noStrike" kern="1200" dirty="0">
+                <a:solidFill>
+                  <a:schemeClr val="tx1"/>
+                </a:solidFill>
+                <a:effectLst/>
+                <a:latin typeface="+mn-lt"/>
+                <a:ea typeface="+mn-ea"/>
+                <a:cs typeface="+mn-cs"/>
+              </a:rPr>
+              <a:t>Oregon</a:t>
+            </a:r>
+            <a:r>
+              <a:rPr lang="en-US" b="0" dirty="0"/>
+              <a:t> </a:t>
+            </a:r>
+            <a:r>
+              <a:rPr lang="en-US" sz="1200" b="0" i="0" u="none" strike="noStrike" kern="1200" dirty="0">
+                <a:solidFill>
+                  <a:schemeClr val="tx1"/>
+                </a:solidFill>
+                <a:effectLst/>
+                <a:latin typeface="+mn-lt"/>
+                <a:ea typeface="+mn-ea"/>
+                <a:cs typeface="+mn-cs"/>
+              </a:rPr>
+              <a:t>Texas</a:t>
+            </a:r>
+            <a:r>
+              <a:rPr lang="en-US" b="0" dirty="0"/>
+              <a:t> </a:t>
+            </a:r>
+            <a:r>
+              <a:rPr lang="en-US" sz="1200" b="0" i="0" u="none" strike="noStrike" kern="1200" dirty="0">
+                <a:solidFill>
+                  <a:schemeClr val="tx1"/>
+                </a:solidFill>
+                <a:effectLst/>
+                <a:latin typeface="+mn-lt"/>
+                <a:ea typeface="+mn-ea"/>
+                <a:cs typeface="+mn-cs"/>
+              </a:rPr>
+              <a:t>New York</a:t>
+            </a:r>
+            <a:r>
+              <a:rPr lang="en-US" b="0" dirty="0"/>
+              <a:t> </a:t>
+            </a:r>
+            <a:r>
+              <a:rPr lang="en-US" sz="1200" b="0" i="0" u="none" strike="noStrike" kern="1200" dirty="0">
+                <a:solidFill>
+                  <a:schemeClr val="tx1"/>
+                </a:solidFill>
+                <a:effectLst/>
+                <a:latin typeface="+mn-lt"/>
+                <a:ea typeface="+mn-ea"/>
+                <a:cs typeface="+mn-cs"/>
+              </a:rPr>
+              <a:t>New Jersey</a:t>
+            </a:r>
+            <a:r>
+              <a:rPr lang="en-US" b="0" dirty="0"/>
+              <a:t> </a:t>
+            </a:r>
+            <a:r>
+              <a:rPr lang="en-US" sz="1200" b="0" i="0" u="none" strike="noStrike" kern="1200" dirty="0">
+                <a:solidFill>
+                  <a:schemeClr val="tx1"/>
+                </a:solidFill>
+                <a:effectLst/>
+                <a:latin typeface="+mn-lt"/>
+                <a:ea typeface="+mn-ea"/>
+                <a:cs typeface="+mn-cs"/>
+              </a:rPr>
+              <a:t>Minnesota</a:t>
+            </a:r>
+            <a:r>
+              <a:rPr lang="en-US" b="0" dirty="0"/>
+              <a:t> </a:t>
+            </a:r>
+            <a:r>
+              <a:rPr lang="en-US" sz="1200" b="0" i="0" u="none" strike="noStrike" kern="1200" dirty="0">
+                <a:solidFill>
+                  <a:schemeClr val="tx1"/>
+                </a:solidFill>
+                <a:effectLst/>
+                <a:latin typeface="+mn-lt"/>
+                <a:ea typeface="+mn-ea"/>
+                <a:cs typeface="+mn-cs"/>
+              </a:rPr>
+              <a:t>Utah</a:t>
+            </a:r>
+            <a:r>
+              <a:rPr lang="en-US" b="0" dirty="0"/>
+              <a:t> </a:t>
+            </a:r>
+          </a:p>
+        </p:txBody>
+      </p:sp>
+      <p:sp>
+        <p:nvSpPr>
+          <p:cNvPr id="4" name="Slide Number Placeholder 3"/>
+          <p:cNvSpPr>
+            <a:spLocks noGrp="1"/>
+          </p:cNvSpPr>
+          <p:nvPr>
+            <p:ph type="sldNum" sz="quarter" idx="10"/>
+          </p:nvPr>
+        </p:nvSpPr>
+        <p:spPr/>
+        <p:txBody>
+          <a:bodyPr/>
+          <a:lstStyle/>
+          <a:p>
+            <a:fld id="{15736144-2E2E-483E-8D4E-7A087D64C6CE}" type="slidenum">
+              <a:rPr lang="en-US" smtClean="0"/>
+              <a:t>10</a:t>
+            </a:fld>
+            <a:endParaRPr lang="en-US"/>
+          </a:p>
+        </p:txBody>
+      </p:sp>
+    </p:spTree>
+    <p:extLst>
+      <p:ext uri="{BB962C8B-B14F-4D97-AF65-F5344CB8AC3E}">
+        <p14:creationId xmlns:p14="http://schemas.microsoft.com/office/powerpoint/2010/main" val="3678784281"/>
+      </p:ext>
+    </p:extLst>
+  </p:cSld>
+  <p:clrMapOvr>
+    <a:masterClrMapping/>
+  </p:clrMapOvr>
+</p:notes>
+</file>
+
+<file path=ppt/notesSlides/notesSlide11.xml><?xml version="1.0" encoding="utf-8"?>
+<p:notes xmlns:a="http://schemas.openxmlformats.org/drawingml/2006/main" xmlns:r="http://schemas.openxmlformats.org/officeDocument/2006/relationships" xmlns:p="http://schemas.openxmlformats.org/presentationml/2006/main">
+  <p:cSld>
+    <p:spTree>
+      <p:nvGrpSpPr>
+        <p:cNvPr id="1" name=""/>
+        <p:cNvGrpSpPr/>
+        <p:nvPr/>
+      </p:nvGrpSpPr>
+      <p:grpSpPr>
+        <a:xfrm>
+          <a:off x="0" y="0"/>
+          <a:ext cx="0" cy="0"/>
+          <a:chOff x="0" y="0"/>
+          <a:chExt cx="0" cy="0"/>
+        </a:xfrm>
+      </p:grpSpPr>
+      <p:sp>
+        <p:nvSpPr>
+          <p:cNvPr id="2" name="Slide Image Placeholder 1"/>
+          <p:cNvSpPr>
+            <a:spLocks noGrp="1" noRot="1" noChangeAspect="1"/>
+          </p:cNvSpPr>
+          <p:nvPr>
+            <p:ph type="sldImg"/>
+          </p:nvPr>
+        </p:nvSpPr>
+        <p:spPr/>
+      </p:sp>
+      <p:sp>
+        <p:nvSpPr>
+          <p:cNvPr id="3" name="Notes Placeholder 2"/>
+          <p:cNvSpPr>
+            <a:spLocks noGrp="1"/>
+          </p:cNvSpPr>
+          <p:nvPr>
+            <p:ph type="body" idx="1"/>
+          </p:nvPr>
+        </p:nvSpPr>
+        <p:spPr/>
+        <p:txBody>
+          <a:bodyPr/>
+          <a:lstStyle/>
+          <a:p>
+            <a:r>
+              <a:rPr lang="en-US" b="1" dirty="0"/>
               <a:t>Top 5 States :</a:t>
             </a:r>
             <a:r>
@@ -699,7 +956,7 @@
           <a:p>
             <a:fld id="{15736144-2E2E-483E-8D4E-7A087D64C6CE}" type="slidenum">
               <a:rPr lang="en-US" smtClean="0"/>
-              <a:t>10</a:t>
+              <a:t>11</a:t>
             </a:fld>
             <a:endParaRPr lang="en-US"/>
           </a:p>
@@ -709,121 +966,6 @@
     <p:extLst>
       <p:ext uri="{BB962C8B-B14F-4D97-AF65-F5344CB8AC3E}">
         <p14:creationId xmlns:p14="http://schemas.microsoft.com/office/powerpoint/2010/main" val="3407222623"/>
-      </p:ext>
-    </p:extLst>
-  </p:cSld>
-  <p:clrMapOvr>
-    <a:masterClrMapping/>
-  </p:clrMapOvr>
-</p:notes>
-</file>
-
-<file path=ppt/notesSlides/notesSlide11.xml><?xml version="1.0" encoding="utf-8"?>
-<p:notes xmlns:a="http://schemas.openxmlformats.org/drawingml/2006/main" xmlns:r="http://schemas.openxmlformats.org/officeDocument/2006/relationships" xmlns:p="http://schemas.openxmlformats.org/presentationml/2006/main">
-  <p:cSld>
-    <p:spTree>
-      <p:nvGrpSpPr>
-        <p:cNvPr id="1" name=""/>
-        <p:cNvGrpSpPr/>
-        <p:nvPr/>
-      </p:nvGrpSpPr>
-      <p:grpSpPr>
-        <a:xfrm>
-          <a:off x="0" y="0"/>
-          <a:ext cx="0" cy="0"/>
-          <a:chOff x="0" y="0"/>
-          <a:chExt cx="0" cy="0"/>
-        </a:xfrm>
-      </p:grpSpPr>
-      <p:sp>
-        <p:nvSpPr>
-          <p:cNvPr id="2" name="Slide Image Placeholder 1"/>
-          <p:cNvSpPr>
-            <a:spLocks noGrp="1" noRot="1" noChangeAspect="1"/>
-          </p:cNvSpPr>
-          <p:nvPr>
-            <p:ph type="sldImg"/>
-          </p:nvPr>
-        </p:nvSpPr>
-        <p:spPr/>
-      </p:sp>
-      <p:sp>
-        <p:nvSpPr>
-          <p:cNvPr id="3" name="Notes Placeholder 2"/>
-          <p:cNvSpPr>
-            <a:spLocks noGrp="1"/>
-          </p:cNvSpPr>
-          <p:nvPr>
-            <p:ph type="body" idx="1"/>
-          </p:nvPr>
-        </p:nvSpPr>
-        <p:spPr/>
-        <p:txBody>
-          <a:bodyPr/>
-          <a:lstStyle/>
-          <a:p>
-            <a:r>
-              <a:rPr lang="en-US" b="1" dirty="0"/>
-              <a:t>Question appears </a:t>
-            </a:r>
-            <a:r>
-              <a:rPr lang="en-US" dirty="0"/>
-              <a:t>-&gt; [Narrator] Discuss what we tried to investigate and what are the components of ‘gun-friendliness’ rating -&gt; </a:t>
-            </a:r>
-            <a:r>
-              <a:rPr lang="en-US" b="1" dirty="0"/>
-              <a:t>Click</a:t>
-            </a:r>
-            <a:r>
-              <a:rPr lang="en-US" dirty="0"/>
-              <a:t> -&gt; </a:t>
-            </a:r>
-            <a:r>
-              <a:rPr lang="en-US" b="1" dirty="0"/>
-              <a:t>Answer appears </a:t>
-            </a:r>
-            <a:r>
-              <a:rPr lang="en-US" dirty="0"/>
-              <a:t>-&gt; </a:t>
-            </a:r>
-            <a:r>
-              <a:rPr lang="en-US" b="1" dirty="0"/>
-              <a:t>Charts appear </a:t>
-            </a:r>
-            <a:r>
-              <a:rPr lang="en-US" dirty="0"/>
-              <a:t>-&gt; [Narrator] Draw a conclusion that there is no correlation</a:t>
-            </a:r>
-          </a:p>
-        </p:txBody>
-      </p:sp>
-      <p:sp>
-        <p:nvSpPr>
-          <p:cNvPr id="4" name="Slide Number Placeholder 3"/>
-          <p:cNvSpPr>
-            <a:spLocks noGrp="1"/>
-          </p:cNvSpPr>
-          <p:nvPr>
-            <p:ph type="sldNum" sz="quarter" idx="5"/>
-          </p:nvPr>
-        </p:nvSpPr>
-        <p:spPr/>
-        <p:txBody>
-          <a:bodyPr/>
-          <a:lstStyle/>
-          <a:p>
-            <a:fld id="{15736144-2E2E-483E-8D4E-7A087D64C6CE}" type="slidenum">
-              <a:rPr lang="en-US" smtClean="0"/>
-              <a:t>11</a:t>
-            </a:fld>
-            <a:endParaRPr lang="en-US"/>
-          </a:p>
-        </p:txBody>
-      </p:sp>
-    </p:spTree>
-    <p:extLst>
-      <p:ext uri="{BB962C8B-B14F-4D97-AF65-F5344CB8AC3E}">
-        <p14:creationId xmlns:p14="http://schemas.microsoft.com/office/powerpoint/2010/main" val="965858639"/>
       </p:ext>
     </p:extLst>
   </p:cSld>
@@ -2037,6 +2179,121 @@
             </a:r>
             <a:r>
               <a:rPr lang="en-US" dirty="0"/>
+              <a:t>-&gt; [Narrator] Discuss what we tried to investigate and what are the components of ‘gun-friendliness’ rating -&gt; </a:t>
+            </a:r>
+            <a:r>
+              <a:rPr lang="en-US" b="1" dirty="0"/>
+              <a:t>Click</a:t>
+            </a:r>
+            <a:r>
+              <a:rPr lang="en-US" dirty="0"/>
+              <a:t> -&gt; </a:t>
+            </a:r>
+            <a:r>
+              <a:rPr lang="en-US" b="1" dirty="0"/>
+              <a:t>Answer appears </a:t>
+            </a:r>
+            <a:r>
+              <a:rPr lang="en-US" dirty="0"/>
+              <a:t>-&gt; </a:t>
+            </a:r>
+            <a:r>
+              <a:rPr lang="en-US" b="1" dirty="0"/>
+              <a:t>Charts appear </a:t>
+            </a:r>
+            <a:r>
+              <a:rPr lang="en-US" dirty="0"/>
+              <a:t>-&gt; [Narrator] Draw a conclusion that there is no correlation</a:t>
+            </a:r>
+          </a:p>
+        </p:txBody>
+      </p:sp>
+      <p:sp>
+        <p:nvSpPr>
+          <p:cNvPr id="4" name="Slide Number Placeholder 3"/>
+          <p:cNvSpPr>
+            <a:spLocks noGrp="1"/>
+          </p:cNvSpPr>
+          <p:nvPr>
+            <p:ph type="sldNum" sz="quarter" idx="5"/>
+          </p:nvPr>
+        </p:nvSpPr>
+        <p:spPr/>
+        <p:txBody>
+          <a:bodyPr/>
+          <a:lstStyle/>
+          <a:p>
+            <a:fld id="{15736144-2E2E-483E-8D4E-7A087D64C6CE}" type="slidenum">
+              <a:rPr lang="en-US" smtClean="0"/>
+              <a:t>7</a:t>
+            </a:fld>
+            <a:endParaRPr lang="en-US"/>
+          </a:p>
+        </p:txBody>
+      </p:sp>
+    </p:spTree>
+    <p:extLst>
+      <p:ext uri="{BB962C8B-B14F-4D97-AF65-F5344CB8AC3E}">
+        <p14:creationId xmlns:p14="http://schemas.microsoft.com/office/powerpoint/2010/main" val="965858639"/>
+      </p:ext>
+    </p:extLst>
+  </p:cSld>
+  <p:clrMapOvr>
+    <a:masterClrMapping/>
+  </p:clrMapOvr>
+</p:notes>
+</file>
+
+<file path=ppt/notesSlides/notesSlide8.xml><?xml version="1.0" encoding="utf-8"?>
+<p:notes xmlns:a="http://schemas.openxmlformats.org/drawingml/2006/main" xmlns:r="http://schemas.openxmlformats.org/officeDocument/2006/relationships" xmlns:p="http://schemas.openxmlformats.org/presentationml/2006/main">
+  <p:cSld>
+    <p:spTree>
+      <p:nvGrpSpPr>
+        <p:cNvPr id="1" name=""/>
+        <p:cNvGrpSpPr/>
+        <p:nvPr/>
+      </p:nvGrpSpPr>
+      <p:grpSpPr>
+        <a:xfrm>
+          <a:off x="0" y="0"/>
+          <a:ext cx="0" cy="0"/>
+          <a:chOff x="0" y="0"/>
+          <a:chExt cx="0" cy="0"/>
+        </a:xfrm>
+      </p:grpSpPr>
+      <p:sp>
+        <p:nvSpPr>
+          <p:cNvPr id="2" name="Slide Image Placeholder 1"/>
+          <p:cNvSpPr>
+            <a:spLocks noGrp="1" noRot="1" noChangeAspect="1"/>
+          </p:cNvSpPr>
+          <p:nvPr>
+            <p:ph type="sldImg"/>
+          </p:nvPr>
+        </p:nvSpPr>
+        <p:spPr/>
+      </p:sp>
+      <p:sp>
+        <p:nvSpPr>
+          <p:cNvPr id="3" name="Notes Placeholder 2"/>
+          <p:cNvSpPr>
+            <a:spLocks noGrp="1"/>
+          </p:cNvSpPr>
+          <p:nvPr>
+            <p:ph type="body" idx="1"/>
+          </p:nvPr>
+        </p:nvSpPr>
+        <p:spPr/>
+        <p:txBody>
+          <a:bodyPr/>
+          <a:lstStyle/>
+          <a:p>
+            <a:r>
+              <a:rPr lang="en-US" b="1" dirty="0"/>
+              <a:t>Question appears </a:t>
+            </a:r>
+            <a:r>
+              <a:rPr lang="en-US" dirty="0"/>
               <a:t>-&gt; [Narrator] A couple of words on what we look for comparing time and incident number -&gt; [Click] -&gt; </a:t>
             </a:r>
             <a:r>
@@ -2083,7 +2340,7 @@
           <a:p>
             <a:fld id="{15736144-2E2E-483E-8D4E-7A087D64C6CE}" type="slidenum">
               <a:rPr lang="en-US" smtClean="0"/>
-              <a:t>7</a:t>
+              <a:t>8</a:t>
             </a:fld>
             <a:endParaRPr lang="en-US"/>
           </a:p>
@@ -2102,7 +2359,7 @@
 </p:notes>
 </file>
 
-<file path=ppt/notesSlides/notesSlide8.xml><?xml version="1.0" encoding="utf-8"?>
+<file path=ppt/notesSlides/notesSlide9.xml><?xml version="1.0" encoding="utf-8"?>
 <p:notes xmlns:a="http://schemas.openxmlformats.org/drawingml/2006/main" xmlns:r="http://schemas.openxmlformats.org/officeDocument/2006/relationships" xmlns:p="http://schemas.openxmlformats.org/presentationml/2006/main">
   <p:cSld>
     <p:spTree>
@@ -2194,7 +2451,7 @@
           <a:p>
             <a:fld id="{15736144-2E2E-483E-8D4E-7A087D64C6CE}" type="slidenum">
               <a:rPr lang="en-US" smtClean="0"/>
-              <a:t>8</a:t>
+              <a:t>9</a:t>
             </a:fld>
             <a:endParaRPr lang="en-US"/>
           </a:p>
@@ -2204,263 +2461,6 @@
     <p:extLst>
       <p:ext uri="{BB962C8B-B14F-4D97-AF65-F5344CB8AC3E}">
         <p14:creationId xmlns:p14="http://schemas.microsoft.com/office/powerpoint/2010/main" val="1577796568"/>
-      </p:ext>
-    </p:extLst>
-  </p:cSld>
-  <p:clrMapOvr>
-    <a:masterClrMapping/>
-  </p:clrMapOvr>
-</p:notes>
-</file>
-
-<file path=ppt/notesSlides/notesSlide9.xml><?xml version="1.0" encoding="utf-8"?>
-<p:notes xmlns:a="http://schemas.openxmlformats.org/drawingml/2006/main" xmlns:r="http://schemas.openxmlformats.org/officeDocument/2006/relationships" xmlns:p="http://schemas.openxmlformats.org/presentationml/2006/main">
-  <p:cSld>
-    <p:spTree>
-      <p:nvGrpSpPr>
-        <p:cNvPr id="1" name=""/>
-        <p:cNvGrpSpPr/>
-        <p:nvPr/>
-      </p:nvGrpSpPr>
-      <p:grpSpPr>
-        <a:xfrm>
-          <a:off x="0" y="0"/>
-          <a:ext cx="0" cy="0"/>
-          <a:chOff x="0" y="0"/>
-          <a:chExt cx="0" cy="0"/>
-        </a:xfrm>
-      </p:grpSpPr>
-      <p:sp>
-        <p:nvSpPr>
-          <p:cNvPr id="2" name="Slide Image Placeholder 1"/>
-          <p:cNvSpPr>
-            <a:spLocks noGrp="1" noRot="1" noChangeAspect="1"/>
-          </p:cNvSpPr>
-          <p:nvPr>
-            <p:ph type="sldImg"/>
-          </p:nvPr>
-        </p:nvSpPr>
-        <p:spPr/>
-      </p:sp>
-      <p:sp>
-        <p:nvSpPr>
-          <p:cNvPr id="3" name="Notes Placeholder 2"/>
-          <p:cNvSpPr>
-            <a:spLocks noGrp="1"/>
-          </p:cNvSpPr>
-          <p:nvPr>
-            <p:ph type="body" idx="1"/>
-          </p:nvPr>
-        </p:nvSpPr>
-        <p:spPr/>
-        <p:txBody>
-          <a:bodyPr/>
-          <a:lstStyle/>
-          <a:p>
-            <a:r>
-              <a:rPr lang="en-US" b="1" dirty="0"/>
-              <a:t>Top States from 14 to 17: </a:t>
-            </a:r>
-            <a:r>
-              <a:rPr lang="en-US" dirty="0"/>
-              <a:t>DC, Alaska, Delaware, Louisiana, </a:t>
-            </a:r>
-          </a:p>
-          <a:p>
-            <a:r>
-              <a:rPr lang="en-US" b="1" dirty="0"/>
-              <a:t>Bottom States 14 to 17:  </a:t>
-            </a:r>
-            <a:r>
-              <a:rPr lang="en-US" sz="1200" b="0" i="0" u="none" strike="noStrike" kern="1200" dirty="0">
-                <a:solidFill>
-                  <a:schemeClr val="tx1"/>
-                </a:solidFill>
-                <a:effectLst/>
-                <a:latin typeface="+mn-lt"/>
-                <a:ea typeface="+mn-ea"/>
-                <a:cs typeface="+mn-cs"/>
-              </a:rPr>
-              <a:t>California</a:t>
-            </a:r>
-            <a:r>
-              <a:rPr lang="en-US" b="0" dirty="0"/>
-              <a:t> </a:t>
-            </a:r>
-            <a:r>
-              <a:rPr lang="en-US" sz="1200" b="0" i="0" u="none" strike="noStrike" kern="1200" dirty="0">
-                <a:solidFill>
-                  <a:schemeClr val="tx1"/>
-                </a:solidFill>
-                <a:effectLst/>
-                <a:latin typeface="+mn-lt"/>
-                <a:ea typeface="+mn-ea"/>
-                <a:cs typeface="+mn-cs"/>
-              </a:rPr>
-              <a:t>Colorado</a:t>
-            </a:r>
-            <a:r>
-              <a:rPr lang="en-US" b="0" dirty="0"/>
-              <a:t> </a:t>
-            </a:r>
-            <a:r>
-              <a:rPr lang="en-US" sz="1200" b="0" i="0" u="none" strike="noStrike" kern="1200" dirty="0">
-                <a:solidFill>
-                  <a:schemeClr val="tx1"/>
-                </a:solidFill>
-                <a:effectLst/>
-                <a:latin typeface="+mn-lt"/>
-                <a:ea typeface="+mn-ea"/>
-                <a:cs typeface="+mn-cs"/>
-              </a:rPr>
-              <a:t>Hawaii</a:t>
-            </a:r>
-            <a:r>
-              <a:rPr lang="en-US" b="0" dirty="0"/>
-              <a:t> </a:t>
-            </a:r>
-            <a:r>
-              <a:rPr lang="en-US" sz="1200" b="0" i="0" u="none" strike="noStrike" kern="1200" dirty="0">
-                <a:solidFill>
-                  <a:schemeClr val="tx1"/>
-                </a:solidFill>
-                <a:effectLst/>
-                <a:latin typeface="+mn-lt"/>
-                <a:ea typeface="+mn-ea"/>
-                <a:cs typeface="+mn-cs"/>
-              </a:rPr>
-              <a:t>Idaho</a:t>
-            </a:r>
-            <a:r>
-              <a:rPr lang="en-US" b="0" dirty="0"/>
-              <a:t> </a:t>
-            </a:r>
-            <a:r>
-              <a:rPr lang="en-US" sz="1200" b="0" i="0" u="none" strike="noStrike" kern="1200" dirty="0">
-                <a:solidFill>
-                  <a:schemeClr val="tx1"/>
-                </a:solidFill>
-                <a:effectLst/>
-                <a:latin typeface="+mn-lt"/>
-                <a:ea typeface="+mn-ea"/>
-                <a:cs typeface="+mn-cs"/>
-              </a:rPr>
-              <a:t>Oregon</a:t>
-            </a:r>
-            <a:r>
-              <a:rPr lang="en-US" b="0" dirty="0"/>
-              <a:t> </a:t>
-            </a:r>
-            <a:r>
-              <a:rPr lang="en-US" sz="1200" b="0" i="0" u="none" strike="noStrike" kern="1200" dirty="0">
-                <a:solidFill>
-                  <a:schemeClr val="tx1"/>
-                </a:solidFill>
-                <a:effectLst/>
-                <a:latin typeface="+mn-lt"/>
-                <a:ea typeface="+mn-ea"/>
-                <a:cs typeface="+mn-cs"/>
-              </a:rPr>
-              <a:t>Texas</a:t>
-            </a:r>
-            <a:r>
-              <a:rPr lang="en-US" b="0" dirty="0"/>
-              <a:t> </a:t>
-            </a:r>
-            <a:r>
-              <a:rPr lang="en-US" sz="1200" b="0" i="0" u="none" strike="noStrike" kern="1200" dirty="0">
-                <a:solidFill>
-                  <a:schemeClr val="tx1"/>
-                </a:solidFill>
-                <a:effectLst/>
-                <a:latin typeface="+mn-lt"/>
-                <a:ea typeface="+mn-ea"/>
-                <a:cs typeface="+mn-cs"/>
-              </a:rPr>
-              <a:t>New York</a:t>
-            </a:r>
-            <a:r>
-              <a:rPr lang="en-US" b="0" dirty="0"/>
-              <a:t> </a:t>
-            </a:r>
-            <a:r>
-              <a:rPr lang="en-US" sz="1200" b="0" i="0" u="none" strike="noStrike" kern="1200" dirty="0">
-                <a:solidFill>
-                  <a:schemeClr val="tx1"/>
-                </a:solidFill>
-                <a:effectLst/>
-                <a:latin typeface="+mn-lt"/>
-                <a:ea typeface="+mn-ea"/>
-                <a:cs typeface="+mn-cs"/>
-              </a:rPr>
-              <a:t>New Jersey</a:t>
-            </a:r>
-            <a:r>
-              <a:rPr lang="en-US" b="0" dirty="0"/>
-              <a:t> </a:t>
-            </a:r>
-            <a:r>
-              <a:rPr lang="en-US" sz="1200" b="0" i="0" u="none" strike="noStrike" kern="1200" dirty="0">
-                <a:solidFill>
-                  <a:schemeClr val="tx1"/>
-                </a:solidFill>
-                <a:effectLst/>
-                <a:latin typeface="+mn-lt"/>
-                <a:ea typeface="+mn-ea"/>
-                <a:cs typeface="+mn-cs"/>
-              </a:rPr>
-              <a:t>Minnesota</a:t>
-            </a:r>
-            <a:r>
-              <a:rPr lang="en-US" b="0" dirty="0"/>
-              <a:t> </a:t>
-            </a:r>
-            <a:r>
-              <a:rPr lang="en-US" sz="1200" b="0" i="0" u="none" strike="noStrike" kern="1200" dirty="0">
-                <a:solidFill>
-                  <a:schemeClr val="tx1"/>
-                </a:solidFill>
-                <a:effectLst/>
-                <a:latin typeface="+mn-lt"/>
-                <a:ea typeface="+mn-ea"/>
-                <a:cs typeface="+mn-cs"/>
-              </a:rPr>
-              <a:t>Utah</a:t>
-            </a:r>
-            <a:r>
-              <a:rPr lang="en-US" b="0" dirty="0"/>
-              <a:t> </a:t>
-            </a:r>
-          </a:p>
-        </p:txBody>
-      </p:sp>
-      <p:sp>
-        <p:nvSpPr>
-          <p:cNvPr id="4" name="Slide Number Placeholder 3"/>
-          <p:cNvSpPr>
-            <a:spLocks noGrp="1"/>
-          </p:cNvSpPr>
-          <p:nvPr>
-            <p:ph type="sldNum" sz="quarter" idx="10"/>
-          </p:nvPr>
-        </p:nvSpPr>
-        <p:spPr/>
-        <p:txBody>
-          <a:bodyPr/>
-          <a:lstStyle/>
-          <a:p>
-            <a:fld id="{15736144-2E2E-483E-8D4E-7A087D64C6CE}" type="slidenum">
-              <a:rPr lang="en-US" smtClean="0"/>
-              <a:t>9</a:t>
-            </a:fld>
-            <a:endParaRPr lang="en-US"/>
-          </a:p>
-        </p:txBody>
-      </p:sp>
-    </p:spTree>
-    <p:extLst>
-      <p:ext uri="{BB962C8B-B14F-4D97-AF65-F5344CB8AC3E}">
-        <p14:creationId xmlns:p14="http://schemas.microsoft.com/office/powerpoint/2010/main" val="3678784281"/>
       </p:ext>
     </p:extLst>
   </p:cSld>
@@ -6106,6 +6106,558 @@
       </p:grpSpPr>
       <p:pic>
         <p:nvPicPr>
+          <p:cNvPr id="7" name="Picture 6"/>
+          <p:cNvPicPr>
+            <a:picLocks noChangeAspect="1"/>
+          </p:cNvPicPr>
+          <p:nvPr/>
+        </p:nvPicPr>
+        <p:blipFill>
+          <a:blip r:embed="rId4"/>
+          <a:stretch>
+            <a:fillRect/>
+          </a:stretch>
+        </p:blipFill>
+        <p:spPr>
+          <a:xfrm>
+            <a:off x="8649416" y="63947"/>
+            <a:ext cx="3470063" cy="1144920"/>
+          </a:xfrm>
+          <a:prstGeom prst="rect">
+            <a:avLst/>
+          </a:prstGeom>
+          <a:solidFill>
+            <a:schemeClr val="tx1"/>
+          </a:solidFill>
+        </p:spPr>
+      </p:pic>
+      <p:sp>
+        <p:nvSpPr>
+          <p:cNvPr id="6" name="Title 1">
+            <a:extLst>
+              <a:ext uri="{FF2B5EF4-FFF2-40B4-BE49-F238E27FC236}">
+                <a16:creationId xmlns:a16="http://schemas.microsoft.com/office/drawing/2014/main" id="{1861BABD-EEBB-44A2-A643-6073F5992F78}"/>
+              </a:ext>
+            </a:extLst>
+          </p:cNvPr>
+          <p:cNvSpPr txBox="1">
+            <a:spLocks/>
+          </p:cNvSpPr>
+          <p:nvPr/>
+        </p:nvSpPr>
+        <p:spPr>
+          <a:xfrm>
+            <a:off x="72521" y="0"/>
+            <a:ext cx="9049139" cy="1110342"/>
+          </a:xfrm>
+          <a:prstGeom prst="rect">
+            <a:avLst/>
+          </a:prstGeom>
+        </p:spPr>
+        <p:txBody>
+          <a:bodyPr vert="horz" lIns="91440" tIns="45720" rIns="91440" bIns="45720" rtlCol="0" anchor="ctr">
+            <a:noAutofit/>
+          </a:bodyPr>
+          <a:lstStyle>
+            <a:lvl1pPr algn="l" defTabSz="914400" rtl="0" eaLnBrk="1" latinLnBrk="0" hangingPunct="1">
+              <a:lnSpc>
+                <a:spcPct val="90000"/>
+              </a:lnSpc>
+              <a:spcBef>
+                <a:spcPct val="0"/>
+              </a:spcBef>
+              <a:buNone/>
+              <a:defRPr sz="4400" kern="1200">
+                <a:solidFill>
+                  <a:schemeClr val="tx1"/>
+                </a:solidFill>
+                <a:latin typeface="+mj-lt"/>
+                <a:ea typeface="+mj-ea"/>
+                <a:cs typeface="+mj-cs"/>
+              </a:defRPr>
+            </a:lvl1pPr>
+          </a:lstStyle>
+          <a:p>
+            <a:r>
+              <a:rPr lang="en-US" dirty="0"/>
+              <a:t>A: BETTER MOVE SOMEWHERE ELSE</a:t>
+            </a:r>
+          </a:p>
+        </p:txBody>
+      </p:sp>
+      <p:pic>
+        <p:nvPicPr>
+          <p:cNvPr id="9" name="Picture 8">
+            <a:extLst>
+              <a:ext uri="{FF2B5EF4-FFF2-40B4-BE49-F238E27FC236}">
+                <a16:creationId xmlns:a16="http://schemas.microsoft.com/office/drawing/2014/main" id="{59AEFF44-6074-4558-BC76-D139B03CE62D}"/>
+              </a:ext>
+            </a:extLst>
+          </p:cNvPr>
+          <p:cNvPicPr>
+            <a:picLocks noChangeAspect="1"/>
+          </p:cNvPicPr>
+          <p:nvPr/>
+        </p:nvPicPr>
+        <p:blipFill>
+          <a:blip r:embed="rId5">
+            <a:extLst>
+              <a:ext uri="{28A0092B-C50C-407E-A947-70E740481C1C}">
+                <a14:useLocalDpi xmlns:a14="http://schemas.microsoft.com/office/drawing/2010/main" val="0"/>
+              </a:ext>
+            </a:extLst>
+          </a:blip>
+          <a:stretch>
+            <a:fillRect/>
+          </a:stretch>
+        </p:blipFill>
+        <p:spPr>
+          <a:xfrm>
+            <a:off x="4580" y="1437969"/>
+            <a:ext cx="12187420" cy="2636086"/>
+          </a:xfrm>
+          <a:prstGeom prst="rect">
+            <a:avLst/>
+          </a:prstGeom>
+        </p:spPr>
+      </p:pic>
+      <p:pic>
+        <p:nvPicPr>
+          <p:cNvPr id="10" name="Picture 9">
+            <a:extLst>
+              <a:ext uri="{FF2B5EF4-FFF2-40B4-BE49-F238E27FC236}">
+                <a16:creationId xmlns:a16="http://schemas.microsoft.com/office/drawing/2014/main" id="{69EC3301-4C33-4851-90D8-AABBD231FFD7}"/>
+              </a:ext>
+            </a:extLst>
+          </p:cNvPr>
+          <p:cNvPicPr>
+            <a:picLocks noChangeAspect="1"/>
+          </p:cNvPicPr>
+          <p:nvPr/>
+        </p:nvPicPr>
+        <p:blipFill>
+          <a:blip r:embed="rId6">
+            <a:extLst>
+              <a:ext uri="{28A0092B-C50C-407E-A947-70E740481C1C}">
+                <a14:useLocalDpi xmlns:a14="http://schemas.microsoft.com/office/drawing/2010/main" val="0"/>
+              </a:ext>
+            </a:extLst>
+          </a:blip>
+          <a:stretch>
+            <a:fillRect/>
+          </a:stretch>
+        </p:blipFill>
+        <p:spPr>
+          <a:xfrm>
+            <a:off x="4580" y="4151599"/>
+            <a:ext cx="12187420" cy="2611590"/>
+          </a:xfrm>
+          <a:prstGeom prst="rect">
+            <a:avLst/>
+          </a:prstGeom>
+        </p:spPr>
+      </p:pic>
+    </p:spTree>
+    <p:extLst>
+      <p:ext uri="{BB962C8B-B14F-4D97-AF65-F5344CB8AC3E}">
+        <p14:creationId xmlns:p14="http://schemas.microsoft.com/office/powerpoint/2010/main" val="2831406197"/>
+      </p:ext>
+    </p:extLst>
+  </p:cSld>
+  <p:clrMapOvr>
+    <a:masterClrMapping/>
+  </p:clrMapOvr>
+  <p:timing>
+    <p:tnLst>
+      <p:par>
+        <p:cTn id="1" dur="indefinite" restart="never" nodeType="tmRoot">
+          <p:childTnLst>
+            <p:seq concurrent="1" nextAc="seek">
+              <p:cTn id="2" dur="indefinite" nodeType="mainSeq">
+                <p:childTnLst>
+                  <p:par>
+                    <p:cTn id="3" fill="hold">
+                      <p:stCondLst>
+                        <p:cond delay="indefinite"/>
+                        <p:cond evt="onBegin" delay="0">
+                          <p:tn val="2"/>
+                        </p:cond>
+                      </p:stCondLst>
+                      <p:childTnLst>
+                        <p:par>
+                          <p:cTn id="4" fill="hold">
+                            <p:stCondLst>
+                              <p:cond delay="0"/>
+                            </p:stCondLst>
+                            <p:childTnLst>
+                              <p:par>
+                                <p:cTn id="5" presetID="2" presetClass="entr" presetSubtype="8" fill="hold" grpId="0" nodeType="withEffect">
+                                  <p:stCondLst>
+                                    <p:cond delay="0"/>
+                                  </p:stCondLst>
+                                  <p:childTnLst>
+                                    <p:set>
+                                      <p:cBhvr>
+                                        <p:cTn id="6" dur="1" fill="hold">
+                                          <p:stCondLst>
+                                            <p:cond delay="0"/>
+                                          </p:stCondLst>
+                                        </p:cTn>
+                                        <p:tgtEl>
+                                          <p:spTgt spid="6"/>
+                                        </p:tgtEl>
+                                        <p:attrNameLst>
+                                          <p:attrName>style.visibility</p:attrName>
+                                        </p:attrNameLst>
+                                      </p:cBhvr>
+                                      <p:to>
+                                        <p:strVal val="visible"/>
+                                      </p:to>
+                                    </p:set>
+                                    <p:anim calcmode="lin" valueType="num">
+                                      <p:cBhvr additive="base">
+                                        <p:cTn id="7" dur="500" fill="hold"/>
+                                        <p:tgtEl>
+                                          <p:spTgt spid="6"/>
+                                        </p:tgtEl>
+                                        <p:attrNameLst>
+                                          <p:attrName>ppt_x</p:attrName>
+                                        </p:attrNameLst>
+                                      </p:cBhvr>
+                                      <p:tavLst>
+                                        <p:tav tm="0">
+                                          <p:val>
+                                            <p:strVal val="0-#ppt_w/2"/>
+                                          </p:val>
+                                        </p:tav>
+                                        <p:tav tm="100000">
+                                          <p:val>
+                                            <p:strVal val="#ppt_x"/>
+                                          </p:val>
+                                        </p:tav>
+                                      </p:tavLst>
+                                    </p:anim>
+                                    <p:anim calcmode="lin" valueType="num">
+                                      <p:cBhvr additive="base">
+                                        <p:cTn id="8" dur="500" fill="hold"/>
+                                        <p:tgtEl>
+                                          <p:spTgt spid="6"/>
+                                        </p:tgtEl>
+                                        <p:attrNameLst>
+                                          <p:attrName>ppt_y</p:attrName>
+                                        </p:attrNameLst>
+                                      </p:cBhvr>
+                                      <p:tavLst>
+                                        <p:tav tm="0">
+                                          <p:val>
+                                            <p:strVal val="#ppt_y"/>
+                                          </p:val>
+                                        </p:tav>
+                                        <p:tav tm="100000">
+                                          <p:val>
+                                            <p:strVal val="#ppt_y"/>
+                                          </p:val>
+                                        </p:tav>
+                                      </p:tavLst>
+                                    </p:anim>
+                                  </p:childTnLst>
+                                </p:cTn>
+                              </p:par>
+                            </p:childTnLst>
+                          </p:cTn>
+                        </p:par>
+                        <p:par>
+                          <p:cTn id="9" fill="hold">
+                            <p:stCondLst>
+                              <p:cond delay="500"/>
+                            </p:stCondLst>
+                            <p:childTnLst>
+                              <p:par>
+                                <p:cTn id="10" presetID="2" presetClass="entr" presetSubtype="8" fill="hold" nodeType="afterEffect">
+                                  <p:stCondLst>
+                                    <p:cond delay="500"/>
+                                  </p:stCondLst>
+                                  <p:childTnLst>
+                                    <p:set>
+                                      <p:cBhvr>
+                                        <p:cTn id="11" dur="1" fill="hold">
+                                          <p:stCondLst>
+                                            <p:cond delay="0"/>
+                                          </p:stCondLst>
+                                        </p:cTn>
+                                        <p:tgtEl>
+                                          <p:spTgt spid="9"/>
+                                        </p:tgtEl>
+                                        <p:attrNameLst>
+                                          <p:attrName>style.visibility</p:attrName>
+                                        </p:attrNameLst>
+                                      </p:cBhvr>
+                                      <p:to>
+                                        <p:strVal val="visible"/>
+                                      </p:to>
+                                    </p:set>
+                                    <p:anim calcmode="lin" valueType="num">
+                                      <p:cBhvr additive="base">
+                                        <p:cTn id="12" dur="500" fill="hold"/>
+                                        <p:tgtEl>
+                                          <p:spTgt spid="9"/>
+                                        </p:tgtEl>
+                                        <p:attrNameLst>
+                                          <p:attrName>ppt_x</p:attrName>
+                                        </p:attrNameLst>
+                                      </p:cBhvr>
+                                      <p:tavLst>
+                                        <p:tav tm="0">
+                                          <p:val>
+                                            <p:strVal val="0-#ppt_w/2"/>
+                                          </p:val>
+                                        </p:tav>
+                                        <p:tav tm="100000">
+                                          <p:val>
+                                            <p:strVal val="#ppt_x"/>
+                                          </p:val>
+                                        </p:tav>
+                                      </p:tavLst>
+                                    </p:anim>
+                                    <p:anim calcmode="lin" valueType="num">
+                                      <p:cBhvr additive="base">
+                                        <p:cTn id="13" dur="500" fill="hold"/>
+                                        <p:tgtEl>
+                                          <p:spTgt spid="9"/>
+                                        </p:tgtEl>
+                                        <p:attrNameLst>
+                                          <p:attrName>ppt_y</p:attrName>
+                                        </p:attrNameLst>
+                                      </p:cBhvr>
+                                      <p:tavLst>
+                                        <p:tav tm="0">
+                                          <p:val>
+                                            <p:strVal val="#ppt_y"/>
+                                          </p:val>
+                                        </p:tav>
+                                        <p:tav tm="100000">
+                                          <p:val>
+                                            <p:strVal val="#ppt_y"/>
+                                          </p:val>
+                                        </p:tav>
+                                      </p:tavLst>
+                                    </p:anim>
+                                  </p:childTnLst>
+                                </p:cTn>
+                              </p:par>
+                              <p:par>
+                                <p:cTn id="14" presetID="2" presetClass="entr" presetSubtype="2" fill="hold" nodeType="withEffect">
+                                  <p:stCondLst>
+                                    <p:cond delay="500"/>
+                                  </p:stCondLst>
+                                  <p:childTnLst>
+                                    <p:set>
+                                      <p:cBhvr>
+                                        <p:cTn id="15" dur="1" fill="hold">
+                                          <p:stCondLst>
+                                            <p:cond delay="0"/>
+                                          </p:stCondLst>
+                                        </p:cTn>
+                                        <p:tgtEl>
+                                          <p:spTgt spid="10"/>
+                                        </p:tgtEl>
+                                        <p:attrNameLst>
+                                          <p:attrName>style.visibility</p:attrName>
+                                        </p:attrNameLst>
+                                      </p:cBhvr>
+                                      <p:to>
+                                        <p:strVal val="visible"/>
+                                      </p:to>
+                                    </p:set>
+                                    <p:anim calcmode="lin" valueType="num">
+                                      <p:cBhvr additive="base">
+                                        <p:cTn id="16" dur="500" fill="hold"/>
+                                        <p:tgtEl>
+                                          <p:spTgt spid="10"/>
+                                        </p:tgtEl>
+                                        <p:attrNameLst>
+                                          <p:attrName>ppt_x</p:attrName>
+                                        </p:attrNameLst>
+                                      </p:cBhvr>
+                                      <p:tavLst>
+                                        <p:tav tm="0">
+                                          <p:val>
+                                            <p:strVal val="1+#ppt_w/2"/>
+                                          </p:val>
+                                        </p:tav>
+                                        <p:tav tm="100000">
+                                          <p:val>
+                                            <p:strVal val="#ppt_x"/>
+                                          </p:val>
+                                        </p:tav>
+                                      </p:tavLst>
+                                    </p:anim>
+                                    <p:anim calcmode="lin" valueType="num">
+                                      <p:cBhvr additive="base">
+                                        <p:cTn id="17" dur="500" fill="hold"/>
+                                        <p:tgtEl>
+                                          <p:spTgt spid="10"/>
+                                        </p:tgtEl>
+                                        <p:attrNameLst>
+                                          <p:attrName>ppt_y</p:attrName>
+                                        </p:attrNameLst>
+                                      </p:cBhvr>
+                                      <p:tavLst>
+                                        <p:tav tm="0">
+                                          <p:val>
+                                            <p:strVal val="#ppt_y"/>
+                                          </p:val>
+                                        </p:tav>
+                                        <p:tav tm="100000">
+                                          <p:val>
+                                            <p:strVal val="#ppt_y"/>
+                                          </p:val>
+                                        </p:tav>
+                                      </p:tavLst>
+                                    </p:anim>
+                                  </p:childTnLst>
+                                </p:cTn>
+                              </p:par>
+                              <p:par>
+                                <p:cTn id="18" presetID="2" presetClass="entr" presetSubtype="1" fill="hold" nodeType="withEffect">
+                                  <p:stCondLst>
+                                    <p:cond delay="500"/>
+                                  </p:stCondLst>
+                                  <p:childTnLst>
+                                    <p:set>
+                                      <p:cBhvr>
+                                        <p:cTn id="19" dur="1" fill="hold">
+                                          <p:stCondLst>
+                                            <p:cond delay="0"/>
+                                          </p:stCondLst>
+                                        </p:cTn>
+                                        <p:tgtEl>
+                                          <p:spTgt spid="7"/>
+                                        </p:tgtEl>
+                                        <p:attrNameLst>
+                                          <p:attrName>style.visibility</p:attrName>
+                                        </p:attrNameLst>
+                                      </p:cBhvr>
+                                      <p:to>
+                                        <p:strVal val="visible"/>
+                                      </p:to>
+                                    </p:set>
+                                    <p:anim calcmode="lin" valueType="num">
+                                      <p:cBhvr additive="base">
+                                        <p:cTn id="20" dur="750" fill="hold"/>
+                                        <p:tgtEl>
+                                          <p:spTgt spid="7"/>
+                                        </p:tgtEl>
+                                        <p:attrNameLst>
+                                          <p:attrName>ppt_x</p:attrName>
+                                        </p:attrNameLst>
+                                      </p:cBhvr>
+                                      <p:tavLst>
+                                        <p:tav tm="0">
+                                          <p:val>
+                                            <p:strVal val="#ppt_x"/>
+                                          </p:val>
+                                        </p:tav>
+                                        <p:tav tm="100000">
+                                          <p:val>
+                                            <p:strVal val="#ppt_x"/>
+                                          </p:val>
+                                        </p:tav>
+                                      </p:tavLst>
+                                    </p:anim>
+                                    <p:anim calcmode="lin" valueType="num">
+                                      <p:cBhvr additive="base">
+                                        <p:cTn id="21" dur="750" fill="hold"/>
+                                        <p:tgtEl>
+                                          <p:spTgt spid="7"/>
+                                        </p:tgtEl>
+                                        <p:attrNameLst>
+                                          <p:attrName>ppt_y</p:attrName>
+                                        </p:attrNameLst>
+                                      </p:cBhvr>
+                                      <p:tavLst>
+                                        <p:tav tm="0">
+                                          <p:val>
+                                            <p:strVal val="0-#ppt_h/2"/>
+                                          </p:val>
+                                        </p:tav>
+                                        <p:tav tm="100000">
+                                          <p:val>
+                                            <p:strVal val="#ppt_y"/>
+                                          </p:val>
+                                        </p:tav>
+                                      </p:tavLst>
+                                    </p:anim>
+                                  </p:childTnLst>
+                                </p:cTn>
+                              </p:par>
+                            </p:childTnLst>
+                          </p:cTn>
+                        </p:par>
+                      </p:childTnLst>
+                    </p:cTn>
+                  </p:par>
+                </p:childTnLst>
+              </p:cTn>
+              <p:prevCondLst>
+                <p:cond evt="onPrev" delay="0">
+                  <p:tgtEl>
+                    <p:sldTgt/>
+                  </p:tgtEl>
+                </p:cond>
+              </p:prevCondLst>
+              <p:nextCondLst>
+                <p:cond evt="onNext" delay="0">
+                  <p:tgtEl>
+                    <p:sldTgt/>
+                  </p:tgtEl>
+                </p:cond>
+              </p:nextCondLst>
+            </p:seq>
+          </p:childTnLst>
+        </p:cTn>
+      </p:par>
+    </p:tnLst>
+    <p:bldLst>
+      <p:bldP spid="6" grpId="0"/>
+    </p:bldLst>
+  </p:timing>
+</p:sld>
+</file>
+
+<file path=ppt/slides/slide11.xml><?xml version="1.0" encoding="utf-8"?>
+<p:sld xmlns:a="http://schemas.openxmlformats.org/drawingml/2006/main" xmlns:r="http://schemas.openxmlformats.org/officeDocument/2006/relationships" xmlns:p="http://schemas.openxmlformats.org/presentationml/2006/main">
+  <p:cSld>
+    <p:bg>
+      <p:bgPr>
+        <a:blipFill dpi="0" rotWithShape="1">
+          <a:blip r:embed="rId3">
+            <a:lum/>
+          </a:blip>
+          <a:srcRect/>
+          <a:stretch>
+            <a:fillRect/>
+          </a:stretch>
+        </a:blipFill>
+        <a:effectLst/>
+      </p:bgPr>
+    </p:bg>
+    <p:spTree>
+      <p:nvGrpSpPr>
+        <p:cNvPr id="1" name=""/>
+        <p:cNvGrpSpPr/>
+        <p:nvPr/>
+      </p:nvGrpSpPr>
+      <p:grpSpPr>
+        <a:xfrm>
+          <a:off x="0" y="0"/>
+          <a:ext cx="0" cy="0"/>
+          <a:chOff x="0" y="0"/>
+          <a:chExt cx="0" cy="0"/>
+        </a:xfrm>
+      </p:grpSpPr>
+      <p:pic>
+        <p:nvPicPr>
           <p:cNvPr id="8" name="Picture 7"/>
           <p:cNvPicPr>
             <a:picLocks noChangeAspect="1"/>
@@ -6620,609 +7172,6 @@
     </p:tnLst>
     <p:bldLst>
       <p:bldP spid="6" grpId="0"/>
-    </p:bldLst>
-  </p:timing>
-</p:sld>
-</file>
-
-<file path=ppt/slides/slide11.xml><?xml version="1.0" encoding="utf-8"?>
-<p:sld xmlns:a="http://schemas.openxmlformats.org/drawingml/2006/main" xmlns:r="http://schemas.openxmlformats.org/officeDocument/2006/relationships" xmlns:p="http://schemas.openxmlformats.org/presentationml/2006/main">
-  <p:cSld>
-    <p:bg>
-      <p:bgPr>
-        <a:blipFill dpi="0" rotWithShape="1">
-          <a:blip r:embed="rId3">
-            <a:lum/>
-          </a:blip>
-          <a:srcRect/>
-          <a:stretch>
-            <a:fillRect/>
-          </a:stretch>
-        </a:blipFill>
-        <a:effectLst/>
-      </p:bgPr>
-    </p:bg>
-    <p:spTree>
-      <p:nvGrpSpPr>
-        <p:cNvPr id="1" name=""/>
-        <p:cNvGrpSpPr/>
-        <p:nvPr/>
-      </p:nvGrpSpPr>
-      <p:grpSpPr>
-        <a:xfrm>
-          <a:off x="0" y="0"/>
-          <a:ext cx="0" cy="0"/>
-          <a:chOff x="0" y="0"/>
-          <a:chExt cx="0" cy="0"/>
-        </a:xfrm>
-      </p:grpSpPr>
-      <p:pic>
-        <p:nvPicPr>
-          <p:cNvPr id="5" name="Picture 4">
-            <a:extLst>
-              <a:ext uri="{FF2B5EF4-FFF2-40B4-BE49-F238E27FC236}">
-                <a16:creationId xmlns:a16="http://schemas.microsoft.com/office/drawing/2014/main" id="{652F8266-5BD3-4F23-BA2F-15BA1184EB66}"/>
-              </a:ext>
-            </a:extLst>
-          </p:cNvPr>
-          <p:cNvPicPr>
-            <a:picLocks noChangeAspect="1"/>
-          </p:cNvPicPr>
-          <p:nvPr/>
-        </p:nvPicPr>
-        <p:blipFill>
-          <a:blip r:embed="rId4"/>
-          <a:stretch>
-            <a:fillRect/>
-          </a:stretch>
-        </p:blipFill>
-        <p:spPr>
-          <a:xfrm>
-            <a:off x="-1" y="1779752"/>
-            <a:ext cx="6036121" cy="3706648"/>
-          </a:xfrm>
-          <a:prstGeom prst="rect">
-            <a:avLst/>
-          </a:prstGeom>
-        </p:spPr>
-      </p:pic>
-      <p:pic>
-        <p:nvPicPr>
-          <p:cNvPr id="6" name="Picture 5">
-            <a:extLst>
-              <a:ext uri="{FF2B5EF4-FFF2-40B4-BE49-F238E27FC236}">
-                <a16:creationId xmlns:a16="http://schemas.microsoft.com/office/drawing/2014/main" id="{F288B351-D75D-453F-8177-F6AA0771636C}"/>
-              </a:ext>
-            </a:extLst>
-          </p:cNvPr>
-          <p:cNvPicPr>
-            <a:picLocks noChangeAspect="1"/>
-          </p:cNvPicPr>
-          <p:nvPr/>
-        </p:nvPicPr>
-        <p:blipFill>
-          <a:blip r:embed="rId5"/>
-          <a:stretch>
-            <a:fillRect/>
-          </a:stretch>
-        </p:blipFill>
-        <p:spPr>
-          <a:xfrm>
-            <a:off x="6036121" y="1779753"/>
-            <a:ext cx="6155879" cy="3706647"/>
-          </a:xfrm>
-          <a:prstGeom prst="rect">
-            <a:avLst/>
-          </a:prstGeom>
-        </p:spPr>
-      </p:pic>
-      <p:sp>
-        <p:nvSpPr>
-          <p:cNvPr id="7" name="Title 1">
-            <a:extLst>
-              <a:ext uri="{FF2B5EF4-FFF2-40B4-BE49-F238E27FC236}">
-                <a16:creationId xmlns:a16="http://schemas.microsoft.com/office/drawing/2014/main" id="{B4CE16BE-F643-4655-800E-73CA3E9B6384}"/>
-              </a:ext>
-            </a:extLst>
-          </p:cNvPr>
-          <p:cNvSpPr txBox="1">
-            <a:spLocks/>
-          </p:cNvSpPr>
-          <p:nvPr/>
-        </p:nvSpPr>
-        <p:spPr>
-          <a:xfrm>
-            <a:off x="838200" y="1"/>
-            <a:ext cx="10515600" cy="774439"/>
-          </a:xfrm>
-          <a:prstGeom prst="rect">
-            <a:avLst/>
-          </a:prstGeom>
-        </p:spPr>
-        <p:txBody>
-          <a:bodyPr>
-            <a:noAutofit/>
-          </a:bodyPr>
-          <a:lstStyle>
-            <a:lvl1pPr algn="l" defTabSz="914400" rtl="0" eaLnBrk="1" latinLnBrk="0" hangingPunct="1">
-              <a:lnSpc>
-                <a:spcPct val="90000"/>
-              </a:lnSpc>
-              <a:spcBef>
-                <a:spcPct val="0"/>
-              </a:spcBef>
-              <a:buNone/>
-              <a:defRPr sz="4400" kern="1200">
-                <a:solidFill>
-                  <a:schemeClr val="tx1"/>
-                </a:solidFill>
-                <a:latin typeface="+mj-lt"/>
-                <a:ea typeface="+mj-ea"/>
-                <a:cs typeface="+mj-cs"/>
-              </a:defRPr>
-            </a:lvl1pPr>
-          </a:lstStyle>
-          <a:p>
-            <a:pPr algn="ctr"/>
-            <a:r>
-              <a:rPr lang="en-US" dirty="0"/>
-              <a:t>Q: MORE GUNS = MORE SHOOTING?</a:t>
-            </a:r>
-          </a:p>
-        </p:txBody>
-      </p:sp>
-      <p:sp>
-        <p:nvSpPr>
-          <p:cNvPr id="8" name="Title 1">
-            <a:extLst>
-              <a:ext uri="{FF2B5EF4-FFF2-40B4-BE49-F238E27FC236}">
-                <a16:creationId xmlns:a16="http://schemas.microsoft.com/office/drawing/2014/main" id="{B23679A5-F176-437F-9098-77B138FECEB9}"/>
-              </a:ext>
-            </a:extLst>
-          </p:cNvPr>
-          <p:cNvSpPr txBox="1">
-            <a:spLocks/>
-          </p:cNvSpPr>
-          <p:nvPr/>
-        </p:nvSpPr>
-        <p:spPr>
-          <a:xfrm>
-            <a:off x="1950097" y="429210"/>
-            <a:ext cx="9049139" cy="1110342"/>
-          </a:xfrm>
-          <a:prstGeom prst="rect">
-            <a:avLst/>
-          </a:prstGeom>
-        </p:spPr>
-        <p:txBody>
-          <a:bodyPr vert="horz" lIns="91440" tIns="45720" rIns="91440" bIns="45720" rtlCol="0" anchor="ctr">
-            <a:noAutofit/>
-          </a:bodyPr>
-          <a:lstStyle>
-            <a:lvl1pPr algn="l" defTabSz="914400" rtl="0" eaLnBrk="1" latinLnBrk="0" hangingPunct="1">
-              <a:lnSpc>
-                <a:spcPct val="90000"/>
-              </a:lnSpc>
-              <a:spcBef>
-                <a:spcPct val="0"/>
-              </a:spcBef>
-              <a:buNone/>
-              <a:defRPr sz="4400" kern="1200">
-                <a:solidFill>
-                  <a:schemeClr val="tx1"/>
-                </a:solidFill>
-                <a:latin typeface="+mj-lt"/>
-                <a:ea typeface="+mj-ea"/>
-                <a:cs typeface="+mj-cs"/>
-              </a:defRPr>
-            </a:lvl1pPr>
-          </a:lstStyle>
-          <a:p>
-            <a:r>
-              <a:rPr lang="en-US" dirty="0"/>
-              <a:t>A: SUPRISINGLY, NOT EXACTLY</a:t>
-            </a:r>
-          </a:p>
-        </p:txBody>
-      </p:sp>
-    </p:spTree>
-    <p:extLst>
-      <p:ext uri="{BB962C8B-B14F-4D97-AF65-F5344CB8AC3E}">
-        <p14:creationId xmlns:p14="http://schemas.microsoft.com/office/powerpoint/2010/main" val="2107278466"/>
-      </p:ext>
-    </p:extLst>
-  </p:cSld>
-  <p:clrMapOvr>
-    <a:masterClrMapping/>
-  </p:clrMapOvr>
-  <p:timing>
-    <p:tnLst>
-      <p:par>
-        <p:cTn id="1" dur="indefinite" restart="never" nodeType="tmRoot">
-          <p:childTnLst>
-            <p:seq concurrent="1" nextAc="seek">
-              <p:cTn id="2" dur="indefinite" nodeType="mainSeq">
-                <p:childTnLst>
-                  <p:par>
-                    <p:cTn id="3" fill="hold">
-                      <p:stCondLst>
-                        <p:cond delay="indefinite"/>
-                        <p:cond evt="onBegin" delay="0">
-                          <p:tn val="2"/>
-                        </p:cond>
-                      </p:stCondLst>
-                      <p:childTnLst>
-                        <p:par>
-                          <p:cTn id="4" fill="hold">
-                            <p:stCondLst>
-                              <p:cond delay="0"/>
-                            </p:stCondLst>
-                            <p:childTnLst>
-                              <p:par>
-                                <p:cTn id="5" presetID="42" presetClass="entr" presetSubtype="0" fill="hold" grpId="0" nodeType="withEffect">
-                                  <p:stCondLst>
-                                    <p:cond delay="0"/>
-                                  </p:stCondLst>
-                                  <p:childTnLst>
-                                    <p:set>
-                                      <p:cBhvr>
-                                        <p:cTn id="6" dur="1" fill="hold">
-                                          <p:stCondLst>
-                                            <p:cond delay="0"/>
-                                          </p:stCondLst>
-                                        </p:cTn>
-                                        <p:tgtEl>
-                                          <p:spTgt spid="7"/>
-                                        </p:tgtEl>
-                                        <p:attrNameLst>
-                                          <p:attrName>style.visibility</p:attrName>
-                                        </p:attrNameLst>
-                                      </p:cBhvr>
-                                      <p:to>
-                                        <p:strVal val="visible"/>
-                                      </p:to>
-                                    </p:set>
-                                    <p:animEffect transition="in" filter="fade">
-                                      <p:cBhvr>
-                                        <p:cTn id="7" dur="1000"/>
-                                        <p:tgtEl>
-                                          <p:spTgt spid="7"/>
-                                        </p:tgtEl>
-                                      </p:cBhvr>
-                                    </p:animEffect>
-                                    <p:anim calcmode="lin" valueType="num">
-                                      <p:cBhvr>
-                                        <p:cTn id="8" dur="1000" fill="hold"/>
-                                        <p:tgtEl>
-                                          <p:spTgt spid="7"/>
-                                        </p:tgtEl>
-                                        <p:attrNameLst>
-                                          <p:attrName>ppt_x</p:attrName>
-                                        </p:attrNameLst>
-                                      </p:cBhvr>
-                                      <p:tavLst>
-                                        <p:tav tm="0">
-                                          <p:val>
-                                            <p:strVal val="#ppt_x"/>
-                                          </p:val>
-                                        </p:tav>
-                                        <p:tav tm="100000">
-                                          <p:val>
-                                            <p:strVal val="#ppt_x"/>
-                                          </p:val>
-                                        </p:tav>
-                                      </p:tavLst>
-                                    </p:anim>
-                                    <p:anim calcmode="lin" valueType="num">
-                                      <p:cBhvr>
-                                        <p:cTn id="9" dur="1000" fill="hold"/>
-                                        <p:tgtEl>
-                                          <p:spTgt spid="7"/>
-                                        </p:tgtEl>
-                                        <p:attrNameLst>
-                                          <p:attrName>ppt_y</p:attrName>
-                                        </p:attrNameLst>
-                                      </p:cBhvr>
-                                      <p:tavLst>
-                                        <p:tav tm="0">
-                                          <p:val>
-                                            <p:strVal val="#ppt_y+.1"/>
-                                          </p:val>
-                                        </p:tav>
-                                        <p:tav tm="100000">
-                                          <p:val>
-                                            <p:strVal val="#ppt_y"/>
-                                          </p:val>
-                                        </p:tav>
-                                      </p:tavLst>
-                                    </p:anim>
-                                  </p:childTnLst>
-                                </p:cTn>
-                              </p:par>
-                            </p:childTnLst>
-                          </p:cTn>
-                        </p:par>
-                      </p:childTnLst>
-                    </p:cTn>
-                  </p:par>
-                  <p:par>
-                    <p:cTn id="10" fill="hold">
-                      <p:stCondLst>
-                        <p:cond delay="indefinite"/>
-                      </p:stCondLst>
-                      <p:childTnLst>
-                        <p:par>
-                          <p:cTn id="11" fill="hold">
-                            <p:stCondLst>
-                              <p:cond delay="0"/>
-                            </p:stCondLst>
-                            <p:childTnLst>
-                              <p:par>
-                                <p:cTn id="12" presetID="42" presetClass="entr" presetSubtype="0" fill="hold" grpId="0" nodeType="clickEffect">
-                                  <p:stCondLst>
-                                    <p:cond delay="0"/>
-                                  </p:stCondLst>
-                                  <p:childTnLst>
-                                    <p:set>
-                                      <p:cBhvr>
-                                        <p:cTn id="13" dur="1" fill="hold">
-                                          <p:stCondLst>
-                                            <p:cond delay="0"/>
-                                          </p:stCondLst>
-                                        </p:cTn>
-                                        <p:tgtEl>
-                                          <p:spTgt spid="8"/>
-                                        </p:tgtEl>
-                                        <p:attrNameLst>
-                                          <p:attrName>style.visibility</p:attrName>
-                                        </p:attrNameLst>
-                                      </p:cBhvr>
-                                      <p:to>
-                                        <p:strVal val="visible"/>
-                                      </p:to>
-                                    </p:set>
-                                    <p:animEffect transition="in" filter="fade">
-                                      <p:cBhvr>
-                                        <p:cTn id="14" dur="1000"/>
-                                        <p:tgtEl>
-                                          <p:spTgt spid="8"/>
-                                        </p:tgtEl>
-                                      </p:cBhvr>
-                                    </p:animEffect>
-                                    <p:anim calcmode="lin" valueType="num">
-                                      <p:cBhvr>
-                                        <p:cTn id="15" dur="1000" fill="hold"/>
-                                        <p:tgtEl>
-                                          <p:spTgt spid="8"/>
-                                        </p:tgtEl>
-                                        <p:attrNameLst>
-                                          <p:attrName>ppt_x</p:attrName>
-                                        </p:attrNameLst>
-                                      </p:cBhvr>
-                                      <p:tavLst>
-                                        <p:tav tm="0">
-                                          <p:val>
-                                            <p:strVal val="#ppt_x"/>
-                                          </p:val>
-                                        </p:tav>
-                                        <p:tav tm="100000">
-                                          <p:val>
-                                            <p:strVal val="#ppt_x"/>
-                                          </p:val>
-                                        </p:tav>
-                                      </p:tavLst>
-                                    </p:anim>
-                                    <p:anim calcmode="lin" valueType="num">
-                                      <p:cBhvr>
-                                        <p:cTn id="16" dur="1000" fill="hold"/>
-                                        <p:tgtEl>
-                                          <p:spTgt spid="8"/>
-                                        </p:tgtEl>
-                                        <p:attrNameLst>
-                                          <p:attrName>ppt_y</p:attrName>
-                                        </p:attrNameLst>
-                                      </p:cBhvr>
-                                      <p:tavLst>
-                                        <p:tav tm="0">
-                                          <p:val>
-                                            <p:strVal val="#ppt_y+.1"/>
-                                          </p:val>
-                                        </p:tav>
-                                        <p:tav tm="100000">
-                                          <p:val>
-                                            <p:strVal val="#ppt_y"/>
-                                          </p:val>
-                                        </p:tav>
-                                      </p:tavLst>
-                                    </p:anim>
-                                  </p:childTnLst>
-                                </p:cTn>
-                              </p:par>
-                            </p:childTnLst>
-                          </p:cTn>
-                        </p:par>
-                        <p:par>
-                          <p:cTn id="17" fill="hold">
-                            <p:stCondLst>
-                              <p:cond delay="1000"/>
-                            </p:stCondLst>
-                            <p:childTnLst>
-                              <p:par>
-                                <p:cTn id="18" presetID="2" presetClass="entr" presetSubtype="8" fill="hold" nodeType="afterEffect">
-                                  <p:stCondLst>
-                                    <p:cond delay="750"/>
-                                  </p:stCondLst>
-                                  <p:childTnLst>
-                                    <p:set>
-                                      <p:cBhvr>
-                                        <p:cTn id="19" dur="1" fill="hold">
-                                          <p:stCondLst>
-                                            <p:cond delay="0"/>
-                                          </p:stCondLst>
-                                        </p:cTn>
-                                        <p:tgtEl>
-                                          <p:spTgt spid="5"/>
-                                        </p:tgtEl>
-                                        <p:attrNameLst>
-                                          <p:attrName>style.visibility</p:attrName>
-                                        </p:attrNameLst>
-                                      </p:cBhvr>
-                                      <p:to>
-                                        <p:strVal val="visible"/>
-                                      </p:to>
-                                    </p:set>
-                                    <p:anim calcmode="lin" valueType="num">
-                                      <p:cBhvr additive="base">
-                                        <p:cTn id="20" dur="500" fill="hold"/>
-                                        <p:tgtEl>
-                                          <p:spTgt spid="5"/>
-                                        </p:tgtEl>
-                                        <p:attrNameLst>
-                                          <p:attrName>ppt_x</p:attrName>
-                                        </p:attrNameLst>
-                                      </p:cBhvr>
-                                      <p:tavLst>
-                                        <p:tav tm="0">
-                                          <p:val>
-                                            <p:strVal val="0-#ppt_w/2"/>
-                                          </p:val>
-                                        </p:tav>
-                                        <p:tav tm="100000">
-                                          <p:val>
-                                            <p:strVal val="#ppt_x"/>
-                                          </p:val>
-                                        </p:tav>
-                                      </p:tavLst>
-                                    </p:anim>
-                                    <p:anim calcmode="lin" valueType="num">
-                                      <p:cBhvr additive="base">
-                                        <p:cTn id="21" dur="500" fill="hold"/>
-                                        <p:tgtEl>
-                                          <p:spTgt spid="5"/>
-                                        </p:tgtEl>
-                                        <p:attrNameLst>
-                                          <p:attrName>ppt_y</p:attrName>
-                                        </p:attrNameLst>
-                                      </p:cBhvr>
-                                      <p:tavLst>
-                                        <p:tav tm="0">
-                                          <p:val>
-                                            <p:strVal val="#ppt_y"/>
-                                          </p:val>
-                                        </p:tav>
-                                        <p:tav tm="100000">
-                                          <p:val>
-                                            <p:strVal val="#ppt_y"/>
-                                          </p:val>
-                                        </p:tav>
-                                      </p:tavLst>
-                                    </p:anim>
-                                  </p:childTnLst>
-                                </p:cTn>
-                              </p:par>
-                              <p:par>
-                                <p:cTn id="22" presetID="2" presetClass="entr" presetSubtype="2" fill="hold" nodeType="withEffect">
-                                  <p:stCondLst>
-                                    <p:cond delay="750"/>
-                                  </p:stCondLst>
-                                  <p:childTnLst>
-                                    <p:set>
-                                      <p:cBhvr>
-                                        <p:cTn id="23" dur="1" fill="hold">
-                                          <p:stCondLst>
-                                            <p:cond delay="0"/>
-                                          </p:stCondLst>
-                                        </p:cTn>
-                                        <p:tgtEl>
-                                          <p:spTgt spid="6"/>
-                                        </p:tgtEl>
-                                        <p:attrNameLst>
-                                          <p:attrName>style.visibility</p:attrName>
-                                        </p:attrNameLst>
-                                      </p:cBhvr>
-                                      <p:to>
-                                        <p:strVal val="visible"/>
-                                      </p:to>
-                                    </p:set>
-                                    <p:anim calcmode="lin" valueType="num">
-                                      <p:cBhvr additive="base">
-                                        <p:cTn id="24" dur="500" fill="hold"/>
-                                        <p:tgtEl>
-                                          <p:spTgt spid="6"/>
-                                        </p:tgtEl>
-                                        <p:attrNameLst>
-                                          <p:attrName>ppt_x</p:attrName>
-                                        </p:attrNameLst>
-                                      </p:cBhvr>
-                                      <p:tavLst>
-                                        <p:tav tm="0">
-                                          <p:val>
-                                            <p:strVal val="1+#ppt_w/2"/>
-                                          </p:val>
-                                        </p:tav>
-                                        <p:tav tm="100000">
-                                          <p:val>
-                                            <p:strVal val="#ppt_x"/>
-                                          </p:val>
-                                        </p:tav>
-                                      </p:tavLst>
-                                    </p:anim>
-                                    <p:anim calcmode="lin" valueType="num">
-                                      <p:cBhvr additive="base">
-                                        <p:cTn id="25" dur="500" fill="hold"/>
-                                        <p:tgtEl>
-                                          <p:spTgt spid="6"/>
-                                        </p:tgtEl>
-                                        <p:attrNameLst>
-                                          <p:attrName>ppt_y</p:attrName>
-                                        </p:attrNameLst>
-                                      </p:cBhvr>
-                                      <p:tavLst>
-                                        <p:tav tm="0">
-                                          <p:val>
-                                            <p:strVal val="#ppt_y"/>
-                                          </p:val>
-                                        </p:tav>
-                                        <p:tav tm="100000">
-                                          <p:val>
-                                            <p:strVal val="#ppt_y"/>
-                                          </p:val>
-                                        </p:tav>
-                                      </p:tavLst>
-                                    </p:anim>
-                                  </p:childTnLst>
-                                </p:cTn>
-                              </p:par>
-                            </p:childTnLst>
-                          </p:cTn>
-                        </p:par>
-                      </p:childTnLst>
-                    </p:cTn>
-                  </p:par>
-                </p:childTnLst>
-              </p:cTn>
-              <p:prevCondLst>
-                <p:cond evt="onPrev" delay="0">
-                  <p:tgtEl>
-                    <p:sldTgt/>
-                  </p:tgtEl>
-                </p:cond>
-              </p:prevCondLst>
-              <p:nextCondLst>
-                <p:cond evt="onNext" delay="0">
-                  <p:tgtEl>
-                    <p:sldTgt/>
-                  </p:tgtEl>
-                </p:cond>
-              </p:nextCondLst>
-            </p:seq>
-          </p:childTnLst>
-        </p:cTn>
-      </p:par>
-    </p:tnLst>
-    <p:bldLst>
-      <p:bldP spid="7" grpId="0"/>
-      <p:bldP spid="8" grpId="0"/>
     </p:bldLst>
   </p:timing>
 </p:sld>
@@ -26721,6 +26670,615 @@
       </p:grpSpPr>
       <p:pic>
         <p:nvPicPr>
+          <p:cNvPr id="5" name="Picture 4">
+            <a:extLst>
+              <a:ext uri="{FF2B5EF4-FFF2-40B4-BE49-F238E27FC236}">
+                <a16:creationId xmlns:a16="http://schemas.microsoft.com/office/drawing/2014/main" id="{652F8266-5BD3-4F23-BA2F-15BA1184EB66}"/>
+              </a:ext>
+            </a:extLst>
+          </p:cNvPr>
+          <p:cNvPicPr>
+            <a:picLocks noChangeAspect="1"/>
+          </p:cNvPicPr>
+          <p:nvPr/>
+        </p:nvPicPr>
+        <p:blipFill>
+          <a:blip r:embed="rId4"/>
+          <a:stretch>
+            <a:fillRect/>
+          </a:stretch>
+        </p:blipFill>
+        <p:spPr>
+          <a:xfrm>
+            <a:off x="-1" y="1779752"/>
+            <a:ext cx="6036121" cy="3706648"/>
+          </a:xfrm>
+          <a:prstGeom prst="rect">
+            <a:avLst/>
+          </a:prstGeom>
+        </p:spPr>
+      </p:pic>
+      <p:pic>
+        <p:nvPicPr>
+          <p:cNvPr id="6" name="Picture 5">
+            <a:extLst>
+              <a:ext uri="{FF2B5EF4-FFF2-40B4-BE49-F238E27FC236}">
+                <a16:creationId xmlns:a16="http://schemas.microsoft.com/office/drawing/2014/main" id="{F288B351-D75D-453F-8177-F6AA0771636C}"/>
+              </a:ext>
+            </a:extLst>
+          </p:cNvPr>
+          <p:cNvPicPr>
+            <a:picLocks noChangeAspect="1"/>
+          </p:cNvPicPr>
+          <p:nvPr/>
+        </p:nvPicPr>
+        <p:blipFill>
+          <a:blip r:embed="rId5">
+            <a:extLst>
+              <a:ext uri="{28A0092B-C50C-407E-A947-70E740481C1C}">
+                <a14:useLocalDpi xmlns:a14="http://schemas.microsoft.com/office/drawing/2010/main" val="0"/>
+              </a:ext>
+            </a:extLst>
+          </a:blip>
+          <a:stretch>
+            <a:fillRect/>
+          </a:stretch>
+        </p:blipFill>
+        <p:spPr>
+          <a:xfrm>
+            <a:off x="6036121" y="1779753"/>
+            <a:ext cx="6155880" cy="3706647"/>
+          </a:xfrm>
+          <a:prstGeom prst="rect">
+            <a:avLst/>
+          </a:prstGeom>
+        </p:spPr>
+      </p:pic>
+      <p:sp>
+        <p:nvSpPr>
+          <p:cNvPr id="7" name="Title 1">
+            <a:extLst>
+              <a:ext uri="{FF2B5EF4-FFF2-40B4-BE49-F238E27FC236}">
+                <a16:creationId xmlns:a16="http://schemas.microsoft.com/office/drawing/2014/main" id="{B4CE16BE-F643-4655-800E-73CA3E9B6384}"/>
+              </a:ext>
+            </a:extLst>
+          </p:cNvPr>
+          <p:cNvSpPr txBox="1">
+            <a:spLocks/>
+          </p:cNvSpPr>
+          <p:nvPr/>
+        </p:nvSpPr>
+        <p:spPr>
+          <a:xfrm>
+            <a:off x="838200" y="1"/>
+            <a:ext cx="10515600" cy="774439"/>
+          </a:xfrm>
+          <a:prstGeom prst="rect">
+            <a:avLst/>
+          </a:prstGeom>
+        </p:spPr>
+        <p:txBody>
+          <a:bodyPr>
+            <a:noAutofit/>
+          </a:bodyPr>
+          <a:lstStyle>
+            <a:lvl1pPr algn="l" defTabSz="914400" rtl="0" eaLnBrk="1" latinLnBrk="0" hangingPunct="1">
+              <a:lnSpc>
+                <a:spcPct val="90000"/>
+              </a:lnSpc>
+              <a:spcBef>
+                <a:spcPct val="0"/>
+              </a:spcBef>
+              <a:buNone/>
+              <a:defRPr sz="4400" kern="1200">
+                <a:solidFill>
+                  <a:schemeClr val="tx1"/>
+                </a:solidFill>
+                <a:latin typeface="+mj-lt"/>
+                <a:ea typeface="+mj-ea"/>
+                <a:cs typeface="+mj-cs"/>
+              </a:defRPr>
+            </a:lvl1pPr>
+          </a:lstStyle>
+          <a:p>
+            <a:pPr algn="ctr"/>
+            <a:r>
+              <a:rPr lang="en-US" dirty="0"/>
+              <a:t>Q: MORE GUNS = MORE SHOOTING?</a:t>
+            </a:r>
+          </a:p>
+        </p:txBody>
+      </p:sp>
+      <p:sp>
+        <p:nvSpPr>
+          <p:cNvPr id="8" name="Title 1">
+            <a:extLst>
+              <a:ext uri="{FF2B5EF4-FFF2-40B4-BE49-F238E27FC236}">
+                <a16:creationId xmlns:a16="http://schemas.microsoft.com/office/drawing/2014/main" id="{B23679A5-F176-437F-9098-77B138FECEB9}"/>
+              </a:ext>
+            </a:extLst>
+          </p:cNvPr>
+          <p:cNvSpPr txBox="1">
+            <a:spLocks/>
+          </p:cNvSpPr>
+          <p:nvPr/>
+        </p:nvSpPr>
+        <p:spPr>
+          <a:xfrm>
+            <a:off x="1950097" y="429210"/>
+            <a:ext cx="9049139" cy="1110342"/>
+          </a:xfrm>
+          <a:prstGeom prst="rect">
+            <a:avLst/>
+          </a:prstGeom>
+        </p:spPr>
+        <p:txBody>
+          <a:bodyPr vert="horz" lIns="91440" tIns="45720" rIns="91440" bIns="45720" rtlCol="0" anchor="ctr">
+            <a:noAutofit/>
+          </a:bodyPr>
+          <a:lstStyle>
+            <a:lvl1pPr algn="l" defTabSz="914400" rtl="0" eaLnBrk="1" latinLnBrk="0" hangingPunct="1">
+              <a:lnSpc>
+                <a:spcPct val="90000"/>
+              </a:lnSpc>
+              <a:spcBef>
+                <a:spcPct val="0"/>
+              </a:spcBef>
+              <a:buNone/>
+              <a:defRPr sz="4400" kern="1200">
+                <a:solidFill>
+                  <a:schemeClr val="tx1"/>
+                </a:solidFill>
+                <a:latin typeface="+mj-lt"/>
+                <a:ea typeface="+mj-ea"/>
+                <a:cs typeface="+mj-cs"/>
+              </a:defRPr>
+            </a:lvl1pPr>
+          </a:lstStyle>
+          <a:p>
+            <a:r>
+              <a:rPr lang="en-US" dirty="0"/>
+              <a:t>A: SUPRISINGLY, NOT EXACTLY</a:t>
+            </a:r>
+          </a:p>
+        </p:txBody>
+      </p:sp>
+    </p:spTree>
+    <p:extLst>
+      <p:ext uri="{BB962C8B-B14F-4D97-AF65-F5344CB8AC3E}">
+        <p14:creationId xmlns:p14="http://schemas.microsoft.com/office/powerpoint/2010/main" val="2107278466"/>
+      </p:ext>
+    </p:extLst>
+  </p:cSld>
+  <p:clrMapOvr>
+    <a:masterClrMapping/>
+  </p:clrMapOvr>
+  <p:timing>
+    <p:tnLst>
+      <p:par>
+        <p:cTn id="1" dur="indefinite" restart="never" nodeType="tmRoot">
+          <p:childTnLst>
+            <p:seq concurrent="1" nextAc="seek">
+              <p:cTn id="2" dur="indefinite" nodeType="mainSeq">
+                <p:childTnLst>
+                  <p:par>
+                    <p:cTn id="3" fill="hold">
+                      <p:stCondLst>
+                        <p:cond delay="indefinite"/>
+                        <p:cond evt="onBegin" delay="0">
+                          <p:tn val="2"/>
+                        </p:cond>
+                      </p:stCondLst>
+                      <p:childTnLst>
+                        <p:par>
+                          <p:cTn id="4" fill="hold">
+                            <p:stCondLst>
+                              <p:cond delay="0"/>
+                            </p:stCondLst>
+                            <p:childTnLst>
+                              <p:par>
+                                <p:cTn id="5" presetID="42" presetClass="entr" presetSubtype="0" fill="hold" grpId="0" nodeType="withEffect">
+                                  <p:stCondLst>
+                                    <p:cond delay="0"/>
+                                  </p:stCondLst>
+                                  <p:childTnLst>
+                                    <p:set>
+                                      <p:cBhvr>
+                                        <p:cTn id="6" dur="1" fill="hold">
+                                          <p:stCondLst>
+                                            <p:cond delay="0"/>
+                                          </p:stCondLst>
+                                        </p:cTn>
+                                        <p:tgtEl>
+                                          <p:spTgt spid="7"/>
+                                        </p:tgtEl>
+                                        <p:attrNameLst>
+                                          <p:attrName>style.visibility</p:attrName>
+                                        </p:attrNameLst>
+                                      </p:cBhvr>
+                                      <p:to>
+                                        <p:strVal val="visible"/>
+                                      </p:to>
+                                    </p:set>
+                                    <p:animEffect transition="in" filter="fade">
+                                      <p:cBhvr>
+                                        <p:cTn id="7" dur="1000"/>
+                                        <p:tgtEl>
+                                          <p:spTgt spid="7"/>
+                                        </p:tgtEl>
+                                      </p:cBhvr>
+                                    </p:animEffect>
+                                    <p:anim calcmode="lin" valueType="num">
+                                      <p:cBhvr>
+                                        <p:cTn id="8" dur="1000" fill="hold"/>
+                                        <p:tgtEl>
+                                          <p:spTgt spid="7"/>
+                                        </p:tgtEl>
+                                        <p:attrNameLst>
+                                          <p:attrName>ppt_x</p:attrName>
+                                        </p:attrNameLst>
+                                      </p:cBhvr>
+                                      <p:tavLst>
+                                        <p:tav tm="0">
+                                          <p:val>
+                                            <p:strVal val="#ppt_x"/>
+                                          </p:val>
+                                        </p:tav>
+                                        <p:tav tm="100000">
+                                          <p:val>
+                                            <p:strVal val="#ppt_x"/>
+                                          </p:val>
+                                        </p:tav>
+                                      </p:tavLst>
+                                    </p:anim>
+                                    <p:anim calcmode="lin" valueType="num">
+                                      <p:cBhvr>
+                                        <p:cTn id="9" dur="1000" fill="hold"/>
+                                        <p:tgtEl>
+                                          <p:spTgt spid="7"/>
+                                        </p:tgtEl>
+                                        <p:attrNameLst>
+                                          <p:attrName>ppt_y</p:attrName>
+                                        </p:attrNameLst>
+                                      </p:cBhvr>
+                                      <p:tavLst>
+                                        <p:tav tm="0">
+                                          <p:val>
+                                            <p:strVal val="#ppt_y+.1"/>
+                                          </p:val>
+                                        </p:tav>
+                                        <p:tav tm="100000">
+                                          <p:val>
+                                            <p:strVal val="#ppt_y"/>
+                                          </p:val>
+                                        </p:tav>
+                                      </p:tavLst>
+                                    </p:anim>
+                                  </p:childTnLst>
+                                </p:cTn>
+                              </p:par>
+                            </p:childTnLst>
+                          </p:cTn>
+                        </p:par>
+                      </p:childTnLst>
+                    </p:cTn>
+                  </p:par>
+                  <p:par>
+                    <p:cTn id="10" fill="hold">
+                      <p:stCondLst>
+                        <p:cond delay="indefinite"/>
+                      </p:stCondLst>
+                      <p:childTnLst>
+                        <p:par>
+                          <p:cTn id="11" fill="hold">
+                            <p:stCondLst>
+                              <p:cond delay="0"/>
+                            </p:stCondLst>
+                            <p:childTnLst>
+                              <p:par>
+                                <p:cTn id="12" presetID="42" presetClass="entr" presetSubtype="0" fill="hold" grpId="0" nodeType="clickEffect">
+                                  <p:stCondLst>
+                                    <p:cond delay="0"/>
+                                  </p:stCondLst>
+                                  <p:childTnLst>
+                                    <p:set>
+                                      <p:cBhvr>
+                                        <p:cTn id="13" dur="1" fill="hold">
+                                          <p:stCondLst>
+                                            <p:cond delay="0"/>
+                                          </p:stCondLst>
+                                        </p:cTn>
+                                        <p:tgtEl>
+                                          <p:spTgt spid="8"/>
+                                        </p:tgtEl>
+                                        <p:attrNameLst>
+                                          <p:attrName>style.visibility</p:attrName>
+                                        </p:attrNameLst>
+                                      </p:cBhvr>
+                                      <p:to>
+                                        <p:strVal val="visible"/>
+                                      </p:to>
+                                    </p:set>
+                                    <p:animEffect transition="in" filter="fade">
+                                      <p:cBhvr>
+                                        <p:cTn id="14" dur="1000"/>
+                                        <p:tgtEl>
+                                          <p:spTgt spid="8"/>
+                                        </p:tgtEl>
+                                      </p:cBhvr>
+                                    </p:animEffect>
+                                    <p:anim calcmode="lin" valueType="num">
+                                      <p:cBhvr>
+                                        <p:cTn id="15" dur="1000" fill="hold"/>
+                                        <p:tgtEl>
+                                          <p:spTgt spid="8"/>
+                                        </p:tgtEl>
+                                        <p:attrNameLst>
+                                          <p:attrName>ppt_x</p:attrName>
+                                        </p:attrNameLst>
+                                      </p:cBhvr>
+                                      <p:tavLst>
+                                        <p:tav tm="0">
+                                          <p:val>
+                                            <p:strVal val="#ppt_x"/>
+                                          </p:val>
+                                        </p:tav>
+                                        <p:tav tm="100000">
+                                          <p:val>
+                                            <p:strVal val="#ppt_x"/>
+                                          </p:val>
+                                        </p:tav>
+                                      </p:tavLst>
+                                    </p:anim>
+                                    <p:anim calcmode="lin" valueType="num">
+                                      <p:cBhvr>
+                                        <p:cTn id="16" dur="1000" fill="hold"/>
+                                        <p:tgtEl>
+                                          <p:spTgt spid="8"/>
+                                        </p:tgtEl>
+                                        <p:attrNameLst>
+                                          <p:attrName>ppt_y</p:attrName>
+                                        </p:attrNameLst>
+                                      </p:cBhvr>
+                                      <p:tavLst>
+                                        <p:tav tm="0">
+                                          <p:val>
+                                            <p:strVal val="#ppt_y+.1"/>
+                                          </p:val>
+                                        </p:tav>
+                                        <p:tav tm="100000">
+                                          <p:val>
+                                            <p:strVal val="#ppt_y"/>
+                                          </p:val>
+                                        </p:tav>
+                                      </p:tavLst>
+                                    </p:anim>
+                                  </p:childTnLst>
+                                </p:cTn>
+                              </p:par>
+                            </p:childTnLst>
+                          </p:cTn>
+                        </p:par>
+                        <p:par>
+                          <p:cTn id="17" fill="hold">
+                            <p:stCondLst>
+                              <p:cond delay="1000"/>
+                            </p:stCondLst>
+                            <p:childTnLst>
+                              <p:par>
+                                <p:cTn id="18" presetID="2" presetClass="entr" presetSubtype="8" fill="hold" nodeType="afterEffect">
+                                  <p:stCondLst>
+                                    <p:cond delay="750"/>
+                                  </p:stCondLst>
+                                  <p:childTnLst>
+                                    <p:set>
+                                      <p:cBhvr>
+                                        <p:cTn id="19" dur="1" fill="hold">
+                                          <p:stCondLst>
+                                            <p:cond delay="0"/>
+                                          </p:stCondLst>
+                                        </p:cTn>
+                                        <p:tgtEl>
+                                          <p:spTgt spid="5"/>
+                                        </p:tgtEl>
+                                        <p:attrNameLst>
+                                          <p:attrName>style.visibility</p:attrName>
+                                        </p:attrNameLst>
+                                      </p:cBhvr>
+                                      <p:to>
+                                        <p:strVal val="visible"/>
+                                      </p:to>
+                                    </p:set>
+                                    <p:anim calcmode="lin" valueType="num">
+                                      <p:cBhvr additive="base">
+                                        <p:cTn id="20" dur="500" fill="hold"/>
+                                        <p:tgtEl>
+                                          <p:spTgt spid="5"/>
+                                        </p:tgtEl>
+                                        <p:attrNameLst>
+                                          <p:attrName>ppt_x</p:attrName>
+                                        </p:attrNameLst>
+                                      </p:cBhvr>
+                                      <p:tavLst>
+                                        <p:tav tm="0">
+                                          <p:val>
+                                            <p:strVal val="0-#ppt_w/2"/>
+                                          </p:val>
+                                        </p:tav>
+                                        <p:tav tm="100000">
+                                          <p:val>
+                                            <p:strVal val="#ppt_x"/>
+                                          </p:val>
+                                        </p:tav>
+                                      </p:tavLst>
+                                    </p:anim>
+                                    <p:anim calcmode="lin" valueType="num">
+                                      <p:cBhvr additive="base">
+                                        <p:cTn id="21" dur="500" fill="hold"/>
+                                        <p:tgtEl>
+                                          <p:spTgt spid="5"/>
+                                        </p:tgtEl>
+                                        <p:attrNameLst>
+                                          <p:attrName>ppt_y</p:attrName>
+                                        </p:attrNameLst>
+                                      </p:cBhvr>
+                                      <p:tavLst>
+                                        <p:tav tm="0">
+                                          <p:val>
+                                            <p:strVal val="#ppt_y"/>
+                                          </p:val>
+                                        </p:tav>
+                                        <p:tav tm="100000">
+                                          <p:val>
+                                            <p:strVal val="#ppt_y"/>
+                                          </p:val>
+                                        </p:tav>
+                                      </p:tavLst>
+                                    </p:anim>
+                                  </p:childTnLst>
+                                </p:cTn>
+                              </p:par>
+                              <p:par>
+                                <p:cTn id="22" presetID="2" presetClass="entr" presetSubtype="2" fill="hold" nodeType="withEffect">
+                                  <p:stCondLst>
+                                    <p:cond delay="750"/>
+                                  </p:stCondLst>
+                                  <p:childTnLst>
+                                    <p:set>
+                                      <p:cBhvr>
+                                        <p:cTn id="23" dur="1" fill="hold">
+                                          <p:stCondLst>
+                                            <p:cond delay="0"/>
+                                          </p:stCondLst>
+                                        </p:cTn>
+                                        <p:tgtEl>
+                                          <p:spTgt spid="6"/>
+                                        </p:tgtEl>
+                                        <p:attrNameLst>
+                                          <p:attrName>style.visibility</p:attrName>
+                                        </p:attrNameLst>
+                                      </p:cBhvr>
+                                      <p:to>
+                                        <p:strVal val="visible"/>
+                                      </p:to>
+                                    </p:set>
+                                    <p:anim calcmode="lin" valueType="num">
+                                      <p:cBhvr additive="base">
+                                        <p:cTn id="24" dur="500" fill="hold"/>
+                                        <p:tgtEl>
+                                          <p:spTgt spid="6"/>
+                                        </p:tgtEl>
+                                        <p:attrNameLst>
+                                          <p:attrName>ppt_x</p:attrName>
+                                        </p:attrNameLst>
+                                      </p:cBhvr>
+                                      <p:tavLst>
+                                        <p:tav tm="0">
+                                          <p:val>
+                                            <p:strVal val="1+#ppt_w/2"/>
+                                          </p:val>
+                                        </p:tav>
+                                        <p:tav tm="100000">
+                                          <p:val>
+                                            <p:strVal val="#ppt_x"/>
+                                          </p:val>
+                                        </p:tav>
+                                      </p:tavLst>
+                                    </p:anim>
+                                    <p:anim calcmode="lin" valueType="num">
+                                      <p:cBhvr additive="base">
+                                        <p:cTn id="25" dur="500" fill="hold"/>
+                                        <p:tgtEl>
+                                          <p:spTgt spid="6"/>
+                                        </p:tgtEl>
+                                        <p:attrNameLst>
+                                          <p:attrName>ppt_y</p:attrName>
+                                        </p:attrNameLst>
+                                      </p:cBhvr>
+                                      <p:tavLst>
+                                        <p:tav tm="0">
+                                          <p:val>
+                                            <p:strVal val="#ppt_y"/>
+                                          </p:val>
+                                        </p:tav>
+                                        <p:tav tm="100000">
+                                          <p:val>
+                                            <p:strVal val="#ppt_y"/>
+                                          </p:val>
+                                        </p:tav>
+                                      </p:tavLst>
+                                    </p:anim>
+                                  </p:childTnLst>
+                                </p:cTn>
+                              </p:par>
+                            </p:childTnLst>
+                          </p:cTn>
+                        </p:par>
+                      </p:childTnLst>
+                    </p:cTn>
+                  </p:par>
+                </p:childTnLst>
+              </p:cTn>
+              <p:prevCondLst>
+                <p:cond evt="onPrev" delay="0">
+                  <p:tgtEl>
+                    <p:sldTgt/>
+                  </p:tgtEl>
+                </p:cond>
+              </p:prevCondLst>
+              <p:nextCondLst>
+                <p:cond evt="onNext" delay="0">
+                  <p:tgtEl>
+                    <p:sldTgt/>
+                  </p:tgtEl>
+                </p:cond>
+              </p:nextCondLst>
+            </p:seq>
+          </p:childTnLst>
+        </p:cTn>
+      </p:par>
+    </p:tnLst>
+    <p:bldLst>
+      <p:bldP spid="7" grpId="0"/>
+      <p:bldP spid="8" grpId="0"/>
+    </p:bldLst>
+  </p:timing>
+</p:sld>
+</file>
+
+<file path=ppt/slides/slide8.xml><?xml version="1.0" encoding="utf-8"?>
+<p:sld xmlns:a="http://schemas.openxmlformats.org/drawingml/2006/main" xmlns:r="http://schemas.openxmlformats.org/officeDocument/2006/relationships" xmlns:p="http://schemas.openxmlformats.org/presentationml/2006/main">
+  <p:cSld>
+    <p:bg>
+      <p:bgPr>
+        <a:blipFill dpi="0" rotWithShape="1">
+          <a:blip r:embed="rId3">
+            <a:lum/>
+          </a:blip>
+          <a:srcRect/>
+          <a:stretch>
+            <a:fillRect/>
+          </a:stretch>
+        </a:blipFill>
+        <a:effectLst/>
+      </p:bgPr>
+    </p:bg>
+    <p:spTree>
+      <p:nvGrpSpPr>
+        <p:cNvPr id="1" name=""/>
+        <p:cNvGrpSpPr/>
+        <p:nvPr/>
+      </p:nvGrpSpPr>
+      <p:grpSpPr>
+        <a:xfrm>
+          <a:off x="0" y="0"/>
+          <a:ext cx="0" cy="0"/>
+          <a:chOff x="0" y="0"/>
+          <a:chExt cx="0" cy="0"/>
+        </a:xfrm>
+      </p:grpSpPr>
+      <p:pic>
+        <p:nvPicPr>
           <p:cNvPr id="3" name="Picture 2"/>
           <p:cNvPicPr>
             <a:picLocks noChangeAspect="1"/>
@@ -27450,7 +28008,7 @@
 </p:sld>
 </file>
 
-<file path=ppt/slides/slide8.xml><?xml version="1.0" encoding="utf-8"?>
+<file path=ppt/slides/slide9.xml><?xml version="1.0" encoding="utf-8"?>
 <p:sld xmlns:a="http://schemas.openxmlformats.org/drawingml/2006/main" xmlns:r="http://schemas.openxmlformats.org/officeDocument/2006/relationships" xmlns:p="http://schemas.openxmlformats.org/presentationml/2006/main">
   <p:cSld>
     <p:bg>
@@ -28204,558 +28762,6 @@
       <p:bldP spid="2" grpId="1"/>
       <p:bldP spid="3" grpId="0"/>
       <p:bldP spid="3" grpId="1"/>
-    </p:bldLst>
-  </p:timing>
-</p:sld>
-</file>
-
-<file path=ppt/slides/slide9.xml><?xml version="1.0" encoding="utf-8"?>
-<p:sld xmlns:a="http://schemas.openxmlformats.org/drawingml/2006/main" xmlns:r="http://schemas.openxmlformats.org/officeDocument/2006/relationships" xmlns:p="http://schemas.openxmlformats.org/presentationml/2006/main">
-  <p:cSld>
-    <p:bg>
-      <p:bgPr>
-        <a:blipFill dpi="0" rotWithShape="1">
-          <a:blip r:embed="rId3">
-            <a:lum/>
-          </a:blip>
-          <a:srcRect/>
-          <a:stretch>
-            <a:fillRect/>
-          </a:stretch>
-        </a:blipFill>
-        <a:effectLst/>
-      </p:bgPr>
-    </p:bg>
-    <p:spTree>
-      <p:nvGrpSpPr>
-        <p:cNvPr id="1" name=""/>
-        <p:cNvGrpSpPr/>
-        <p:nvPr/>
-      </p:nvGrpSpPr>
-      <p:grpSpPr>
-        <a:xfrm>
-          <a:off x="0" y="0"/>
-          <a:ext cx="0" cy="0"/>
-          <a:chOff x="0" y="0"/>
-          <a:chExt cx="0" cy="0"/>
-        </a:xfrm>
-      </p:grpSpPr>
-      <p:pic>
-        <p:nvPicPr>
-          <p:cNvPr id="7" name="Picture 6"/>
-          <p:cNvPicPr>
-            <a:picLocks noChangeAspect="1"/>
-          </p:cNvPicPr>
-          <p:nvPr/>
-        </p:nvPicPr>
-        <p:blipFill>
-          <a:blip r:embed="rId4"/>
-          <a:stretch>
-            <a:fillRect/>
-          </a:stretch>
-        </p:blipFill>
-        <p:spPr>
-          <a:xfrm>
-            <a:off x="8649416" y="63947"/>
-            <a:ext cx="3470063" cy="1144920"/>
-          </a:xfrm>
-          <a:prstGeom prst="rect">
-            <a:avLst/>
-          </a:prstGeom>
-          <a:solidFill>
-            <a:schemeClr val="tx1"/>
-          </a:solidFill>
-        </p:spPr>
-      </p:pic>
-      <p:sp>
-        <p:nvSpPr>
-          <p:cNvPr id="6" name="Title 1">
-            <a:extLst>
-              <a:ext uri="{FF2B5EF4-FFF2-40B4-BE49-F238E27FC236}">
-                <a16:creationId xmlns:a16="http://schemas.microsoft.com/office/drawing/2014/main" id="{1861BABD-EEBB-44A2-A643-6073F5992F78}"/>
-              </a:ext>
-            </a:extLst>
-          </p:cNvPr>
-          <p:cNvSpPr txBox="1">
-            <a:spLocks/>
-          </p:cNvSpPr>
-          <p:nvPr/>
-        </p:nvSpPr>
-        <p:spPr>
-          <a:xfrm>
-            <a:off x="72521" y="0"/>
-            <a:ext cx="9049139" cy="1110342"/>
-          </a:xfrm>
-          <a:prstGeom prst="rect">
-            <a:avLst/>
-          </a:prstGeom>
-        </p:spPr>
-        <p:txBody>
-          <a:bodyPr vert="horz" lIns="91440" tIns="45720" rIns="91440" bIns="45720" rtlCol="0" anchor="ctr">
-            <a:noAutofit/>
-          </a:bodyPr>
-          <a:lstStyle>
-            <a:lvl1pPr algn="l" defTabSz="914400" rtl="0" eaLnBrk="1" latinLnBrk="0" hangingPunct="1">
-              <a:lnSpc>
-                <a:spcPct val="90000"/>
-              </a:lnSpc>
-              <a:spcBef>
-                <a:spcPct val="0"/>
-              </a:spcBef>
-              <a:buNone/>
-              <a:defRPr sz="4400" kern="1200">
-                <a:solidFill>
-                  <a:schemeClr val="tx1"/>
-                </a:solidFill>
-                <a:latin typeface="+mj-lt"/>
-                <a:ea typeface="+mj-ea"/>
-                <a:cs typeface="+mj-cs"/>
-              </a:defRPr>
-            </a:lvl1pPr>
-          </a:lstStyle>
-          <a:p>
-            <a:r>
-              <a:rPr lang="en-US" dirty="0"/>
-              <a:t>A: BETTER MOVE SOMEWHERE ELSE</a:t>
-            </a:r>
-          </a:p>
-        </p:txBody>
-      </p:sp>
-      <p:pic>
-        <p:nvPicPr>
-          <p:cNvPr id="9" name="Picture 8">
-            <a:extLst>
-              <a:ext uri="{FF2B5EF4-FFF2-40B4-BE49-F238E27FC236}">
-                <a16:creationId xmlns:a16="http://schemas.microsoft.com/office/drawing/2014/main" id="{59AEFF44-6074-4558-BC76-D139B03CE62D}"/>
-              </a:ext>
-            </a:extLst>
-          </p:cNvPr>
-          <p:cNvPicPr>
-            <a:picLocks noChangeAspect="1"/>
-          </p:cNvPicPr>
-          <p:nvPr/>
-        </p:nvPicPr>
-        <p:blipFill>
-          <a:blip r:embed="rId5">
-            <a:extLst>
-              <a:ext uri="{28A0092B-C50C-407E-A947-70E740481C1C}">
-                <a14:useLocalDpi xmlns:a14="http://schemas.microsoft.com/office/drawing/2010/main" val="0"/>
-              </a:ext>
-            </a:extLst>
-          </a:blip>
-          <a:stretch>
-            <a:fillRect/>
-          </a:stretch>
-        </p:blipFill>
-        <p:spPr>
-          <a:xfrm>
-            <a:off x="4580" y="1437969"/>
-            <a:ext cx="12187420" cy="2636086"/>
-          </a:xfrm>
-          <a:prstGeom prst="rect">
-            <a:avLst/>
-          </a:prstGeom>
-        </p:spPr>
-      </p:pic>
-      <p:pic>
-        <p:nvPicPr>
-          <p:cNvPr id="10" name="Picture 9">
-            <a:extLst>
-              <a:ext uri="{FF2B5EF4-FFF2-40B4-BE49-F238E27FC236}">
-                <a16:creationId xmlns:a16="http://schemas.microsoft.com/office/drawing/2014/main" id="{69EC3301-4C33-4851-90D8-AABBD231FFD7}"/>
-              </a:ext>
-            </a:extLst>
-          </p:cNvPr>
-          <p:cNvPicPr>
-            <a:picLocks noChangeAspect="1"/>
-          </p:cNvPicPr>
-          <p:nvPr/>
-        </p:nvPicPr>
-        <p:blipFill>
-          <a:blip r:embed="rId6">
-            <a:extLst>
-              <a:ext uri="{28A0092B-C50C-407E-A947-70E740481C1C}">
-                <a14:useLocalDpi xmlns:a14="http://schemas.microsoft.com/office/drawing/2010/main" val="0"/>
-              </a:ext>
-            </a:extLst>
-          </a:blip>
-          <a:stretch>
-            <a:fillRect/>
-          </a:stretch>
-        </p:blipFill>
-        <p:spPr>
-          <a:xfrm>
-            <a:off x="4580" y="4151599"/>
-            <a:ext cx="12187420" cy="2611590"/>
-          </a:xfrm>
-          <a:prstGeom prst="rect">
-            <a:avLst/>
-          </a:prstGeom>
-        </p:spPr>
-      </p:pic>
-    </p:spTree>
-    <p:extLst>
-      <p:ext uri="{BB962C8B-B14F-4D97-AF65-F5344CB8AC3E}">
-        <p14:creationId xmlns:p14="http://schemas.microsoft.com/office/powerpoint/2010/main" val="2831406197"/>
-      </p:ext>
-    </p:extLst>
-  </p:cSld>
-  <p:clrMapOvr>
-    <a:masterClrMapping/>
-  </p:clrMapOvr>
-  <p:timing>
-    <p:tnLst>
-      <p:par>
-        <p:cTn id="1" dur="indefinite" restart="never" nodeType="tmRoot">
-          <p:childTnLst>
-            <p:seq concurrent="1" nextAc="seek">
-              <p:cTn id="2" dur="indefinite" nodeType="mainSeq">
-                <p:childTnLst>
-                  <p:par>
-                    <p:cTn id="3" fill="hold">
-                      <p:stCondLst>
-                        <p:cond delay="indefinite"/>
-                        <p:cond evt="onBegin" delay="0">
-                          <p:tn val="2"/>
-                        </p:cond>
-                      </p:stCondLst>
-                      <p:childTnLst>
-                        <p:par>
-                          <p:cTn id="4" fill="hold">
-                            <p:stCondLst>
-                              <p:cond delay="0"/>
-                            </p:stCondLst>
-                            <p:childTnLst>
-                              <p:par>
-                                <p:cTn id="5" presetID="2" presetClass="entr" presetSubtype="8" fill="hold" grpId="0" nodeType="withEffect">
-                                  <p:stCondLst>
-                                    <p:cond delay="0"/>
-                                  </p:stCondLst>
-                                  <p:childTnLst>
-                                    <p:set>
-                                      <p:cBhvr>
-                                        <p:cTn id="6" dur="1" fill="hold">
-                                          <p:stCondLst>
-                                            <p:cond delay="0"/>
-                                          </p:stCondLst>
-                                        </p:cTn>
-                                        <p:tgtEl>
-                                          <p:spTgt spid="6"/>
-                                        </p:tgtEl>
-                                        <p:attrNameLst>
-                                          <p:attrName>style.visibility</p:attrName>
-                                        </p:attrNameLst>
-                                      </p:cBhvr>
-                                      <p:to>
-                                        <p:strVal val="visible"/>
-                                      </p:to>
-                                    </p:set>
-                                    <p:anim calcmode="lin" valueType="num">
-                                      <p:cBhvr additive="base">
-                                        <p:cTn id="7" dur="500" fill="hold"/>
-                                        <p:tgtEl>
-                                          <p:spTgt spid="6"/>
-                                        </p:tgtEl>
-                                        <p:attrNameLst>
-                                          <p:attrName>ppt_x</p:attrName>
-                                        </p:attrNameLst>
-                                      </p:cBhvr>
-                                      <p:tavLst>
-                                        <p:tav tm="0">
-                                          <p:val>
-                                            <p:strVal val="0-#ppt_w/2"/>
-                                          </p:val>
-                                        </p:tav>
-                                        <p:tav tm="100000">
-                                          <p:val>
-                                            <p:strVal val="#ppt_x"/>
-                                          </p:val>
-                                        </p:tav>
-                                      </p:tavLst>
-                                    </p:anim>
-                                    <p:anim calcmode="lin" valueType="num">
-                                      <p:cBhvr additive="base">
-                                        <p:cTn id="8" dur="500" fill="hold"/>
-                                        <p:tgtEl>
-                                          <p:spTgt spid="6"/>
-                                        </p:tgtEl>
-                                        <p:attrNameLst>
-                                          <p:attrName>ppt_y</p:attrName>
-                                        </p:attrNameLst>
-                                      </p:cBhvr>
-                                      <p:tavLst>
-                                        <p:tav tm="0">
-                                          <p:val>
-                                            <p:strVal val="#ppt_y"/>
-                                          </p:val>
-                                        </p:tav>
-                                        <p:tav tm="100000">
-                                          <p:val>
-                                            <p:strVal val="#ppt_y"/>
-                                          </p:val>
-                                        </p:tav>
-                                      </p:tavLst>
-                                    </p:anim>
-                                  </p:childTnLst>
-                                </p:cTn>
-                              </p:par>
-                            </p:childTnLst>
-                          </p:cTn>
-                        </p:par>
-                        <p:par>
-                          <p:cTn id="9" fill="hold">
-                            <p:stCondLst>
-                              <p:cond delay="500"/>
-                            </p:stCondLst>
-                            <p:childTnLst>
-                              <p:par>
-                                <p:cTn id="10" presetID="2" presetClass="entr" presetSubtype="8" fill="hold" nodeType="afterEffect">
-                                  <p:stCondLst>
-                                    <p:cond delay="500"/>
-                                  </p:stCondLst>
-                                  <p:childTnLst>
-                                    <p:set>
-                                      <p:cBhvr>
-                                        <p:cTn id="11" dur="1" fill="hold">
-                                          <p:stCondLst>
-                                            <p:cond delay="0"/>
-                                          </p:stCondLst>
-                                        </p:cTn>
-                                        <p:tgtEl>
-                                          <p:spTgt spid="9"/>
-                                        </p:tgtEl>
-                                        <p:attrNameLst>
-                                          <p:attrName>style.visibility</p:attrName>
-                                        </p:attrNameLst>
-                                      </p:cBhvr>
-                                      <p:to>
-                                        <p:strVal val="visible"/>
-                                      </p:to>
-                                    </p:set>
-                                    <p:anim calcmode="lin" valueType="num">
-                                      <p:cBhvr additive="base">
-                                        <p:cTn id="12" dur="500" fill="hold"/>
-                                        <p:tgtEl>
-                                          <p:spTgt spid="9"/>
-                                        </p:tgtEl>
-                                        <p:attrNameLst>
-                                          <p:attrName>ppt_x</p:attrName>
-                                        </p:attrNameLst>
-                                      </p:cBhvr>
-                                      <p:tavLst>
-                                        <p:tav tm="0">
-                                          <p:val>
-                                            <p:strVal val="0-#ppt_w/2"/>
-                                          </p:val>
-                                        </p:tav>
-                                        <p:tav tm="100000">
-                                          <p:val>
-                                            <p:strVal val="#ppt_x"/>
-                                          </p:val>
-                                        </p:tav>
-                                      </p:tavLst>
-                                    </p:anim>
-                                    <p:anim calcmode="lin" valueType="num">
-                                      <p:cBhvr additive="base">
-                                        <p:cTn id="13" dur="500" fill="hold"/>
-                                        <p:tgtEl>
-                                          <p:spTgt spid="9"/>
-                                        </p:tgtEl>
-                                        <p:attrNameLst>
-                                          <p:attrName>ppt_y</p:attrName>
-                                        </p:attrNameLst>
-                                      </p:cBhvr>
-                                      <p:tavLst>
-                                        <p:tav tm="0">
-                                          <p:val>
-                                            <p:strVal val="#ppt_y"/>
-                                          </p:val>
-                                        </p:tav>
-                                        <p:tav tm="100000">
-                                          <p:val>
-                                            <p:strVal val="#ppt_y"/>
-                                          </p:val>
-                                        </p:tav>
-                                      </p:tavLst>
-                                    </p:anim>
-                                  </p:childTnLst>
-                                </p:cTn>
-                              </p:par>
-                              <p:par>
-                                <p:cTn id="14" presetID="2" presetClass="entr" presetSubtype="2" fill="hold" nodeType="withEffect">
-                                  <p:stCondLst>
-                                    <p:cond delay="500"/>
-                                  </p:stCondLst>
-                                  <p:childTnLst>
-                                    <p:set>
-                                      <p:cBhvr>
-                                        <p:cTn id="15" dur="1" fill="hold">
-                                          <p:stCondLst>
-                                            <p:cond delay="0"/>
-                                          </p:stCondLst>
-                                        </p:cTn>
-                                        <p:tgtEl>
-                                          <p:spTgt spid="10"/>
-                                        </p:tgtEl>
-                                        <p:attrNameLst>
-                                          <p:attrName>style.visibility</p:attrName>
-                                        </p:attrNameLst>
-                                      </p:cBhvr>
-                                      <p:to>
-                                        <p:strVal val="visible"/>
-                                      </p:to>
-                                    </p:set>
-                                    <p:anim calcmode="lin" valueType="num">
-                                      <p:cBhvr additive="base">
-                                        <p:cTn id="16" dur="500" fill="hold"/>
-                                        <p:tgtEl>
-                                          <p:spTgt spid="10"/>
-                                        </p:tgtEl>
-                                        <p:attrNameLst>
-                                          <p:attrName>ppt_x</p:attrName>
-                                        </p:attrNameLst>
-                                      </p:cBhvr>
-                                      <p:tavLst>
-                                        <p:tav tm="0">
-                                          <p:val>
-                                            <p:strVal val="1+#ppt_w/2"/>
-                                          </p:val>
-                                        </p:tav>
-                                        <p:tav tm="100000">
-                                          <p:val>
-                                            <p:strVal val="#ppt_x"/>
-                                          </p:val>
-                                        </p:tav>
-                                      </p:tavLst>
-                                    </p:anim>
-                                    <p:anim calcmode="lin" valueType="num">
-                                      <p:cBhvr additive="base">
-                                        <p:cTn id="17" dur="500" fill="hold"/>
-                                        <p:tgtEl>
-                                          <p:spTgt spid="10"/>
-                                        </p:tgtEl>
-                                        <p:attrNameLst>
-                                          <p:attrName>ppt_y</p:attrName>
-                                        </p:attrNameLst>
-                                      </p:cBhvr>
-                                      <p:tavLst>
-                                        <p:tav tm="0">
-                                          <p:val>
-                                            <p:strVal val="#ppt_y"/>
-                                          </p:val>
-                                        </p:tav>
-                                        <p:tav tm="100000">
-                                          <p:val>
-                                            <p:strVal val="#ppt_y"/>
-                                          </p:val>
-                                        </p:tav>
-                                      </p:tavLst>
-                                    </p:anim>
-                                  </p:childTnLst>
-                                </p:cTn>
-                              </p:par>
-                              <p:par>
-                                <p:cTn id="18" presetID="2" presetClass="entr" presetSubtype="1" fill="hold" nodeType="withEffect">
-                                  <p:stCondLst>
-                                    <p:cond delay="500"/>
-                                  </p:stCondLst>
-                                  <p:childTnLst>
-                                    <p:set>
-                                      <p:cBhvr>
-                                        <p:cTn id="19" dur="1" fill="hold">
-                                          <p:stCondLst>
-                                            <p:cond delay="0"/>
-                                          </p:stCondLst>
-                                        </p:cTn>
-                                        <p:tgtEl>
-                                          <p:spTgt spid="7"/>
-                                        </p:tgtEl>
-                                        <p:attrNameLst>
-                                          <p:attrName>style.visibility</p:attrName>
-                                        </p:attrNameLst>
-                                      </p:cBhvr>
-                                      <p:to>
-                                        <p:strVal val="visible"/>
-                                      </p:to>
-                                    </p:set>
-                                    <p:anim calcmode="lin" valueType="num">
-                                      <p:cBhvr additive="base">
-                                        <p:cTn id="20" dur="750" fill="hold"/>
-                                        <p:tgtEl>
-                                          <p:spTgt spid="7"/>
-                                        </p:tgtEl>
-                                        <p:attrNameLst>
-                                          <p:attrName>ppt_x</p:attrName>
-                                        </p:attrNameLst>
-                                      </p:cBhvr>
-                                      <p:tavLst>
-                                        <p:tav tm="0">
-                                          <p:val>
-                                            <p:strVal val="#ppt_x"/>
-                                          </p:val>
-                                        </p:tav>
-                                        <p:tav tm="100000">
-                                          <p:val>
-                                            <p:strVal val="#ppt_x"/>
-                                          </p:val>
-                                        </p:tav>
-                                      </p:tavLst>
-                                    </p:anim>
-                                    <p:anim calcmode="lin" valueType="num">
-                                      <p:cBhvr additive="base">
-                                        <p:cTn id="21" dur="750" fill="hold"/>
-                                        <p:tgtEl>
-                                          <p:spTgt spid="7"/>
-                                        </p:tgtEl>
-                                        <p:attrNameLst>
-                                          <p:attrName>ppt_y</p:attrName>
-                                        </p:attrNameLst>
-                                      </p:cBhvr>
-                                      <p:tavLst>
-                                        <p:tav tm="0">
-                                          <p:val>
-                                            <p:strVal val="0-#ppt_h/2"/>
-                                          </p:val>
-                                        </p:tav>
-                                        <p:tav tm="100000">
-                                          <p:val>
-                                            <p:strVal val="#ppt_y"/>
-                                          </p:val>
-                                        </p:tav>
-                                      </p:tavLst>
-                                    </p:anim>
-                                  </p:childTnLst>
-                                </p:cTn>
-                              </p:par>
-                            </p:childTnLst>
-                          </p:cTn>
-                        </p:par>
-                      </p:childTnLst>
-                    </p:cTn>
-                  </p:par>
-                </p:childTnLst>
-              </p:cTn>
-              <p:prevCondLst>
-                <p:cond evt="onPrev" delay="0">
-                  <p:tgtEl>
-                    <p:sldTgt/>
-                  </p:tgtEl>
-                </p:cond>
-              </p:prevCondLst>
-              <p:nextCondLst>
-                <p:cond evt="onNext" delay="0">
-                  <p:tgtEl>
-                    <p:sldTgt/>
-                  </p:tgtEl>
-                </p:cond>
-              </p:nextCondLst>
-            </p:seq>
-          </p:childTnLst>
-        </p:cTn>
-      </p:par>
-    </p:tnLst>
-    <p:bldLst>
-      <p:bldP spid="6" grpId="0"/>
     </p:bldLst>
   </p:timing>
 </p:sld>

</xml_diff>